<commit_message>
26oct2017 Clase: repaso Comision: 1
</commit_message>
<xml_diff>
--- a/apuntes/tecnicas/Clase2 - Seleccion/2. Seleccion.pptx
+++ b/apuntes/tecnicas/Clase2 - Seleccion/2. Seleccion.pptx
@@ -3119,7 +3119,7 @@
             <a:fld id="{547BB6F4-23E1-814D-8DBC-753DCD8F7CD3}" type="datetimeFigureOut">
               <a:rPr lang="es-ES_tradnl" smtClean="0"/>
               <a:pPr/>
-              <a:t>13/07/2017</a:t>
+              <a:t>23/10/17</a:t>
             </a:fld>
             <a:endParaRPr lang="es-ES_tradnl"/>
           </a:p>
@@ -3186,7 +3186,7 @@
             <a:fld id="{C88F0ACC-9D08-B743-BC76-14D8CF8E6938}" type="slidenum">
               <a:rPr lang="es-ES_tradnl" smtClean="0"/>
               <a:pPr/>
-              <a:t>‹#›</a:t>
+              <a:t>‹Nr.›</a:t>
             </a:fld>
             <a:endParaRPr lang="es-ES_tradnl"/>
           </a:p>
@@ -3286,7 +3286,7 @@
             <a:fld id="{98328938-2154-AC49-8423-1D92A390099E}" type="datetimeFigureOut">
               <a:rPr lang="es-ES_tradnl" smtClean="0"/>
               <a:pPr/>
-              <a:t>13/07/2017</a:t>
+              <a:t>23/10/17</a:t>
             </a:fld>
             <a:endParaRPr lang="es-ES_tradnl"/>
           </a:p>
@@ -3446,7 +3446,7 @@
             <a:fld id="{DC23A042-DB59-4F46-A5FA-899CA8111283}" type="slidenum">
               <a:rPr lang="es-ES_tradnl" smtClean="0"/>
               <a:pPr/>
-              <a:t>‹#›</a:t>
+              <a:t>‹Nr.›</a:t>
             </a:fld>
             <a:endParaRPr lang="es-ES_tradnl"/>
           </a:p>
@@ -4595,7 +4595,7 @@
             <a:fld id="{D802D9E1-0DDA-174F-9155-A972C397A999}" type="slidenum">
               <a:rPr lang="es-ES_tradnl" smtClean="0"/>
               <a:pPr/>
-              <a:t>‹#›</a:t>
+              <a:t>‹Nr.›</a:t>
             </a:fld>
             <a:endParaRPr lang="es-ES_tradnl" dirty="0"/>
           </a:p>
@@ -5247,7 +5247,7 @@
             <a:fld id="{D802D9E1-0DDA-174F-9155-A972C397A999}" type="slidenum">
               <a:rPr lang="es-ES_tradnl" smtClean="0"/>
               <a:pPr/>
-              <a:t>‹#›</a:t>
+              <a:t>‹Nr.›</a:t>
             </a:fld>
             <a:endParaRPr lang="es-ES_tradnl" dirty="0"/>
           </a:p>
@@ -5577,7 +5577,7 @@
             <a:fld id="{D802D9E1-0DDA-174F-9155-A972C397A999}" type="slidenum">
               <a:rPr lang="es-ES_tradnl" smtClean="0"/>
               <a:pPr/>
-              <a:t>‹#›</a:t>
+              <a:t>‹Nr.›</a:t>
             </a:fld>
             <a:endParaRPr lang="es-ES_tradnl" dirty="0"/>
           </a:p>
@@ -5973,7 +5973,7 @@
             <a:fld id="{D802D9E1-0DDA-174F-9155-A972C397A999}" type="slidenum">
               <a:rPr lang="es-ES_tradnl" smtClean="0"/>
               <a:pPr/>
-              <a:t>‹#›</a:t>
+              <a:t>‹Nr.›</a:t>
             </a:fld>
             <a:endParaRPr lang="es-ES_tradnl" dirty="0"/>
           </a:p>
@@ -6125,7 +6125,7 @@
             <a:fld id="{D802D9E1-0DDA-174F-9155-A972C397A999}" type="slidenum">
               <a:rPr lang="es-ES_tradnl" smtClean="0"/>
               <a:pPr/>
-              <a:t>‹#›</a:t>
+              <a:t>‹Nr.›</a:t>
             </a:fld>
             <a:endParaRPr lang="es-ES_tradnl" dirty="0"/>
           </a:p>
@@ -6249,7 +6249,7 @@
             <a:fld id="{D802D9E1-0DDA-174F-9155-A972C397A999}" type="slidenum">
               <a:rPr lang="es-ES_tradnl" smtClean="0"/>
               <a:pPr/>
-              <a:t>‹#›</a:t>
+              <a:t>‹Nr.›</a:t>
             </a:fld>
             <a:endParaRPr lang="es-ES_tradnl" dirty="0"/>
           </a:p>
@@ -6555,7 +6555,7 @@
             <a:fld id="{D802D9E1-0DDA-174F-9155-A972C397A999}" type="slidenum">
               <a:rPr lang="es-ES_tradnl" smtClean="0"/>
               <a:pPr/>
-              <a:t>‹#›</a:t>
+              <a:t>‹Nr.›</a:t>
             </a:fld>
             <a:endParaRPr lang="es-ES_tradnl" dirty="0"/>
           </a:p>
@@ -6841,7 +6841,7 @@
             <a:fld id="{D802D9E1-0DDA-174F-9155-A972C397A999}" type="slidenum">
               <a:rPr lang="es-ES_tradnl" smtClean="0"/>
               <a:pPr/>
-              <a:t>‹#›</a:t>
+              <a:t>‹Nr.›</a:t>
             </a:fld>
             <a:endParaRPr lang="es-ES_tradnl" dirty="0"/>
           </a:p>
@@ -7045,7 +7045,7 @@
             <a:fld id="{D802D9E1-0DDA-174F-9155-A972C397A999}" type="slidenum">
               <a:rPr lang="es-ES_tradnl" smtClean="0"/>
               <a:pPr/>
-              <a:t>‹#›</a:t>
+              <a:t>‹Nr.›</a:t>
             </a:fld>
             <a:endParaRPr lang="es-ES_tradnl" dirty="0"/>
           </a:p>
@@ -7254,7 +7254,7 @@
             <a:fld id="{D802D9E1-0DDA-174F-9155-A972C397A999}" type="slidenum">
               <a:rPr lang="es-ES_tradnl" smtClean="0"/>
               <a:pPr/>
-              <a:t>‹#›</a:t>
+              <a:t>‹Nr.›</a:t>
             </a:fld>
             <a:endParaRPr lang="es-ES_tradnl" dirty="0"/>
           </a:p>
@@ -7503,7 +7503,7 @@
             <a:fld id="{D802D9E1-0DDA-174F-9155-A972C397A999}" type="slidenum">
               <a:rPr lang="es-ES_tradnl" smtClean="0"/>
               <a:pPr/>
-              <a:t>‹#›</a:t>
+              <a:t>‹Nr.›</a:t>
             </a:fld>
             <a:endParaRPr lang="es-ES_tradnl" dirty="0"/>
           </a:p>
@@ -8233,7 +8233,7 @@
             <a:fld id="{D802D9E1-0DDA-174F-9155-A972C397A999}" type="slidenum">
               <a:rPr lang="es-ES_tradnl" smtClean="0"/>
               <a:pPr/>
-              <a:t>‹#›</a:t>
+              <a:t>‹Nr.›</a:t>
             </a:fld>
             <a:endParaRPr lang="es-ES_tradnl" dirty="0"/>
           </a:p>
@@ -8987,7 +8987,7 @@
             <a:fld id="{D802D9E1-0DDA-174F-9155-A972C397A999}" type="slidenum">
               <a:rPr lang="es-ES_tradnl" smtClean="0"/>
               <a:pPr/>
-              <a:t>‹#›</a:t>
+              <a:t>‹Nr.›</a:t>
             </a:fld>
             <a:endParaRPr lang="es-ES_tradnl" dirty="0"/>
           </a:p>
@@ -9741,7 +9741,7 @@
             <a:fld id="{D802D9E1-0DDA-174F-9155-A972C397A999}" type="slidenum">
               <a:rPr lang="es-ES_tradnl" smtClean="0"/>
               <a:pPr/>
-              <a:t>‹#›</a:t>
+              <a:t>‹Nr.›</a:t>
             </a:fld>
             <a:endParaRPr lang="es-ES_tradnl" dirty="0"/>
           </a:p>
@@ -10756,7 +10756,7 @@
             <a:fld id="{D802D9E1-0DDA-174F-9155-A972C397A999}" type="slidenum">
               <a:rPr lang="es-ES_tradnl" smtClean="0"/>
               <a:pPr/>
-              <a:t>‹#›</a:t>
+              <a:t>‹Nr.›</a:t>
             </a:fld>
             <a:endParaRPr lang="es-ES_tradnl" dirty="0"/>
           </a:p>
@@ -15542,21 +15542,21 @@
                 <a:gridCol w="2252773">
                   <a:extLst>
                     <a:ext uri="{9D8B030D-6E8A-4147-A177-3AD203B41FA5}">
-                      <a16:colId xmlns:a16="http://schemas.microsoft.com/office/drawing/2014/main" val="20000"/>
+                      <a16:colId xmlns:a16="http://schemas.microsoft.com/office/drawing/2014/main" xmlns="" val="20000"/>
                     </a:ext>
                   </a:extLst>
                 </a:gridCol>
                 <a:gridCol w="3005027">
                   <a:extLst>
                     <a:ext uri="{9D8B030D-6E8A-4147-A177-3AD203B41FA5}">
-                      <a16:colId xmlns:a16="http://schemas.microsoft.com/office/drawing/2014/main" val="20001"/>
+                      <a16:colId xmlns:a16="http://schemas.microsoft.com/office/drawing/2014/main" xmlns="" val="20001"/>
                     </a:ext>
                   </a:extLst>
                 </a:gridCol>
                 <a:gridCol w="2628900">
                   <a:extLst>
                     <a:ext uri="{9D8B030D-6E8A-4147-A177-3AD203B41FA5}">
-                      <a16:colId xmlns:a16="http://schemas.microsoft.com/office/drawing/2014/main" val="20002"/>
+                      <a16:colId xmlns:a16="http://schemas.microsoft.com/office/drawing/2014/main" xmlns="" val="20002"/>
                     </a:ext>
                   </a:extLst>
                 </a:gridCol>
@@ -15609,7 +15609,7 @@
                 </a:tc>
                 <a:extLst>
                   <a:ext uri="{0D108BD9-81ED-4DB2-BD59-A6C34878D82A}">
-                    <a16:rowId xmlns:a16="http://schemas.microsoft.com/office/drawing/2014/main" val="10000"/>
+                    <a16:rowId xmlns:a16="http://schemas.microsoft.com/office/drawing/2014/main" xmlns="" val="10000"/>
                   </a:ext>
                 </a:extLst>
               </a:tr>
@@ -15661,7 +15661,7 @@
                 </a:tc>
                 <a:extLst>
                   <a:ext uri="{0D108BD9-81ED-4DB2-BD59-A6C34878D82A}">
-                    <a16:rowId xmlns:a16="http://schemas.microsoft.com/office/drawing/2014/main" val="10001"/>
+                    <a16:rowId xmlns:a16="http://schemas.microsoft.com/office/drawing/2014/main" xmlns="" val="10001"/>
                   </a:ext>
                 </a:extLst>
               </a:tr>
@@ -15713,7 +15713,7 @@
                 </a:tc>
                 <a:extLst>
                   <a:ext uri="{0D108BD9-81ED-4DB2-BD59-A6C34878D82A}">
-                    <a16:rowId xmlns:a16="http://schemas.microsoft.com/office/drawing/2014/main" val="10002"/>
+                    <a16:rowId xmlns:a16="http://schemas.microsoft.com/office/drawing/2014/main" xmlns="" val="10002"/>
                   </a:ext>
                 </a:extLst>
               </a:tr>
@@ -15765,7 +15765,7 @@
                 </a:tc>
                 <a:extLst>
                   <a:ext uri="{0D108BD9-81ED-4DB2-BD59-A6C34878D82A}">
-                    <a16:rowId xmlns:a16="http://schemas.microsoft.com/office/drawing/2014/main" val="10003"/>
+                    <a16:rowId xmlns:a16="http://schemas.microsoft.com/office/drawing/2014/main" xmlns="" val="10003"/>
                   </a:ext>
                 </a:extLst>
               </a:tr>
@@ -15817,7 +15817,7 @@
                 </a:tc>
                 <a:extLst>
                   <a:ext uri="{0D108BD9-81ED-4DB2-BD59-A6C34878D82A}">
-                    <a16:rowId xmlns:a16="http://schemas.microsoft.com/office/drawing/2014/main" val="10004"/>
+                    <a16:rowId xmlns:a16="http://schemas.microsoft.com/office/drawing/2014/main" xmlns="" val="10004"/>
                   </a:ext>
                 </a:extLst>
               </a:tr>
@@ -15869,7 +15869,7 @@
                 </a:tc>
                 <a:extLst>
                   <a:ext uri="{0D108BD9-81ED-4DB2-BD59-A6C34878D82A}">
-                    <a16:rowId xmlns:a16="http://schemas.microsoft.com/office/drawing/2014/main" val="10005"/>
+                    <a16:rowId xmlns:a16="http://schemas.microsoft.com/office/drawing/2014/main" xmlns="" val="10005"/>
                   </a:ext>
                 </a:extLst>
               </a:tr>
@@ -15925,7 +15925,7 @@
                 </a:tc>
                 <a:extLst>
                   <a:ext uri="{0D108BD9-81ED-4DB2-BD59-A6C34878D82A}">
-                    <a16:rowId xmlns:a16="http://schemas.microsoft.com/office/drawing/2014/main" val="10006"/>
+                    <a16:rowId xmlns:a16="http://schemas.microsoft.com/office/drawing/2014/main" xmlns="" val="10006"/>
                   </a:ext>
                 </a:extLst>
               </a:tr>
@@ -16012,28 +16012,28 @@
                 <a:gridCol w="1402169">
                   <a:extLst>
                     <a:ext uri="{9D8B030D-6E8A-4147-A177-3AD203B41FA5}">
-                      <a16:colId xmlns:a16="http://schemas.microsoft.com/office/drawing/2014/main" val="20000"/>
+                      <a16:colId xmlns:a16="http://schemas.microsoft.com/office/drawing/2014/main" xmlns="" val="20000"/>
                     </a:ext>
                   </a:extLst>
                 </a:gridCol>
                 <a:gridCol w="2115879">
                   <a:extLst>
                     <a:ext uri="{9D8B030D-6E8A-4147-A177-3AD203B41FA5}">
-                      <a16:colId xmlns:a16="http://schemas.microsoft.com/office/drawing/2014/main" val="20001"/>
+                      <a16:colId xmlns:a16="http://schemas.microsoft.com/office/drawing/2014/main" xmlns="" val="20001"/>
                     </a:ext>
                   </a:extLst>
                 </a:gridCol>
                 <a:gridCol w="2456121">
                   <a:extLst>
                     <a:ext uri="{9D8B030D-6E8A-4147-A177-3AD203B41FA5}">
-                      <a16:colId xmlns:a16="http://schemas.microsoft.com/office/drawing/2014/main" val="20002"/>
+                      <a16:colId xmlns:a16="http://schemas.microsoft.com/office/drawing/2014/main" xmlns="" val="20002"/>
                     </a:ext>
                   </a:extLst>
                 </a:gridCol>
                 <a:gridCol w="1912531">
                   <a:extLst>
                     <a:ext uri="{9D8B030D-6E8A-4147-A177-3AD203B41FA5}">
-                      <a16:colId xmlns:a16="http://schemas.microsoft.com/office/drawing/2014/main" val="20003"/>
+                      <a16:colId xmlns:a16="http://schemas.microsoft.com/office/drawing/2014/main" xmlns="" val="20003"/>
                     </a:ext>
                   </a:extLst>
                 </a:gridCol>
@@ -16101,7 +16101,7 @@
                 </a:tc>
                 <a:extLst>
                   <a:ext uri="{0D108BD9-81ED-4DB2-BD59-A6C34878D82A}">
-                    <a16:rowId xmlns:a16="http://schemas.microsoft.com/office/drawing/2014/main" val="10000"/>
+                    <a16:rowId xmlns:a16="http://schemas.microsoft.com/office/drawing/2014/main" xmlns="" val="10000"/>
                   </a:ext>
                 </a:extLst>
               </a:tr>
@@ -16168,7 +16168,7 @@
                 </a:tc>
                 <a:extLst>
                   <a:ext uri="{0D108BD9-81ED-4DB2-BD59-A6C34878D82A}">
-                    <a16:rowId xmlns:a16="http://schemas.microsoft.com/office/drawing/2014/main" val="10001"/>
+                    <a16:rowId xmlns:a16="http://schemas.microsoft.com/office/drawing/2014/main" xmlns="" val="10001"/>
                   </a:ext>
                 </a:extLst>
               </a:tr>
@@ -16231,7 +16231,7 @@
                 </a:tc>
                 <a:extLst>
                   <a:ext uri="{0D108BD9-81ED-4DB2-BD59-A6C34878D82A}">
-                    <a16:rowId xmlns:a16="http://schemas.microsoft.com/office/drawing/2014/main" val="10002"/>
+                    <a16:rowId xmlns:a16="http://schemas.microsoft.com/office/drawing/2014/main" xmlns="" val="10002"/>
                   </a:ext>
                 </a:extLst>
               </a:tr>
@@ -16294,7 +16294,7 @@
                 </a:tc>
                 <a:extLst>
                   <a:ext uri="{0D108BD9-81ED-4DB2-BD59-A6C34878D82A}">
-                    <a16:rowId xmlns:a16="http://schemas.microsoft.com/office/drawing/2014/main" val="10003"/>
+                    <a16:rowId xmlns:a16="http://schemas.microsoft.com/office/drawing/2014/main" xmlns="" val="10003"/>
                   </a:ext>
                 </a:extLst>
               </a:tr>
@@ -19383,21 +19383,21 @@
                 <a:gridCol w="4635795">
                   <a:extLst>
                     <a:ext uri="{9D8B030D-6E8A-4147-A177-3AD203B41FA5}">
-                      <a16:colId xmlns:a16="http://schemas.microsoft.com/office/drawing/2014/main" val="20000"/>
+                      <a16:colId xmlns:a16="http://schemas.microsoft.com/office/drawing/2014/main" xmlns="" val="20000"/>
                     </a:ext>
                   </a:extLst>
                 </a:gridCol>
                 <a:gridCol w="1765005">
                   <a:extLst>
                     <a:ext uri="{9D8B030D-6E8A-4147-A177-3AD203B41FA5}">
-                      <a16:colId xmlns:a16="http://schemas.microsoft.com/office/drawing/2014/main" val="20001"/>
+                      <a16:colId xmlns:a16="http://schemas.microsoft.com/office/drawing/2014/main" xmlns="" val="20001"/>
                     </a:ext>
                   </a:extLst>
                 </a:gridCol>
                 <a:gridCol w="1838103">
                   <a:extLst>
                     <a:ext uri="{9D8B030D-6E8A-4147-A177-3AD203B41FA5}">
-                      <a16:colId xmlns:a16="http://schemas.microsoft.com/office/drawing/2014/main" val="20002"/>
+                      <a16:colId xmlns:a16="http://schemas.microsoft.com/office/drawing/2014/main" xmlns="" val="20002"/>
                     </a:ext>
                   </a:extLst>
                 </a:gridCol>
@@ -19450,7 +19450,7 @@
                 </a:tc>
                 <a:extLst>
                   <a:ext uri="{0D108BD9-81ED-4DB2-BD59-A6C34878D82A}">
-                    <a16:rowId xmlns:a16="http://schemas.microsoft.com/office/drawing/2014/main" val="10000"/>
+                    <a16:rowId xmlns:a16="http://schemas.microsoft.com/office/drawing/2014/main" xmlns="" val="10000"/>
                   </a:ext>
                 </a:extLst>
               </a:tr>
@@ -19898,7 +19898,7 @@
                 </a:tc>
                 <a:extLst>
                   <a:ext uri="{0D108BD9-81ED-4DB2-BD59-A6C34878D82A}">
-                    <a16:rowId xmlns:a16="http://schemas.microsoft.com/office/drawing/2014/main" val="10001"/>
+                    <a16:rowId xmlns:a16="http://schemas.microsoft.com/office/drawing/2014/main" xmlns="" val="10001"/>
                   </a:ext>
                 </a:extLst>
               </a:tr>
@@ -19974,7 +19974,7 @@
                 </a:tc>
                 <a:extLst>
                   <a:ext uri="{0D108BD9-81ED-4DB2-BD59-A6C34878D82A}">
-                    <a16:rowId xmlns:a16="http://schemas.microsoft.com/office/drawing/2014/main" val="10002"/>
+                    <a16:rowId xmlns:a16="http://schemas.microsoft.com/office/drawing/2014/main" xmlns="" val="10002"/>
                   </a:ext>
                 </a:extLst>
               </a:tr>
@@ -20042,7 +20042,7 @@
                 </a:tc>
                 <a:extLst>
                   <a:ext uri="{0D108BD9-81ED-4DB2-BD59-A6C34878D82A}">
-                    <a16:rowId xmlns:a16="http://schemas.microsoft.com/office/drawing/2014/main" val="10003"/>
+                    <a16:rowId xmlns:a16="http://schemas.microsoft.com/office/drawing/2014/main" xmlns="" val="10003"/>
                   </a:ext>
                 </a:extLst>
               </a:tr>
@@ -20512,7 +20512,7 @@
         <p:spPr>
           <a:xfrm>
             <a:off x="586118" y="2051110"/>
-            <a:ext cx="8196373" cy="4524315"/>
+            <a:ext cx="8196373" cy="4401205"/>
           </a:xfrm>
           <a:prstGeom prst="rect">
             <a:avLst/>
@@ -20525,7 +20525,7 @@
           <a:lstStyle/>
           <a:p>
             <a:r>
-              <a:rPr lang="es-AR" sz="1600" b="1" dirty="0" smtClean="0">
+              <a:rPr lang="es-AR" sz="1400" b="1" dirty="0" smtClean="0">
                 <a:solidFill>
                   <a:srgbClr val="00008B"/>
                 </a:solidFill>
@@ -20533,15 +20533,15 @@
               <a:t>Algoritmo</a:t>
             </a:r>
             <a:r>
-              <a:rPr lang="es-AR" sz="1600" dirty="0" smtClean="0">
-                <a:solidFill>
-                  <a:srgbClr val="000000"/>
-                </a:solidFill>
-              </a:rPr>
-              <a:t> </a:t>
-            </a:r>
-            <a:r>
-              <a:rPr lang="es-AR" sz="1600" dirty="0" err="1" smtClean="0">
+              <a:rPr lang="es-AR" sz="1400" dirty="0" smtClean="0">
+                <a:solidFill>
+                  <a:srgbClr val="000000"/>
+                </a:solidFill>
+              </a:rPr>
+              <a:t> </a:t>
+            </a:r>
+            <a:r>
+              <a:rPr lang="es-AR" sz="1400" dirty="0" err="1" smtClean="0">
                 <a:solidFill>
                   <a:srgbClr val="000000"/>
                 </a:solidFill>
@@ -20549,7 +20549,7 @@
               <a:t>AplicarDescuento</a:t>
             </a:r>
             <a:r>
-              <a:rPr lang="es-AR" sz="1600" dirty="0" smtClean="0">
+              <a:rPr lang="es-AR" sz="1400" dirty="0" smtClean="0">
                 <a:solidFill>
                   <a:srgbClr val="000000"/>
                 </a:solidFill>
@@ -20560,7 +20560,7 @@
           <a:p>
             <a:pPr lvl="1"/>
             <a:r>
-              <a:rPr lang="es-AR" sz="1600" b="1" dirty="0" smtClean="0">
+              <a:rPr lang="es-AR" sz="1400" b="1" dirty="0" smtClean="0">
                 <a:solidFill>
                   <a:srgbClr val="00008B"/>
                 </a:solidFill>
@@ -20568,7 +20568,7 @@
               <a:t>Definir</a:t>
             </a:r>
             <a:r>
-              <a:rPr lang="es-AR" sz="1600" dirty="0" smtClean="0">
+              <a:rPr lang="es-AR" sz="1400" dirty="0" smtClean="0">
                 <a:solidFill>
                   <a:srgbClr val="000000"/>
                 </a:solidFill>
@@ -20576,7 +20576,7 @@
               <a:t> monto </a:t>
             </a:r>
             <a:r>
-              <a:rPr lang="es-AR" sz="1600" b="1" dirty="0" smtClean="0">
+              <a:rPr lang="es-AR" sz="1400" b="1" dirty="0" smtClean="0">
                 <a:solidFill>
                   <a:srgbClr val="00008B"/>
                 </a:solidFill>
@@ -20584,15 +20584,15 @@
               <a:t>Como</a:t>
             </a:r>
             <a:r>
-              <a:rPr lang="es-AR" sz="1600" dirty="0" smtClean="0">
-                <a:solidFill>
-                  <a:srgbClr val="000000"/>
-                </a:solidFill>
-              </a:rPr>
-              <a:t> </a:t>
-            </a:r>
-            <a:r>
-              <a:rPr lang="es-AR" sz="1600" b="1" dirty="0" smtClean="0">
+              <a:rPr lang="es-AR" sz="1400" dirty="0" smtClean="0">
+                <a:solidFill>
+                  <a:srgbClr val="000000"/>
+                </a:solidFill>
+              </a:rPr>
+              <a:t> </a:t>
+            </a:r>
+            <a:r>
+              <a:rPr lang="es-AR" sz="1400" b="1" dirty="0" smtClean="0">
                 <a:solidFill>
                   <a:srgbClr val="00008B"/>
                 </a:solidFill>
@@ -20600,7 +20600,7 @@
               <a:t>Real</a:t>
             </a:r>
             <a:r>
-              <a:rPr lang="es-AR" sz="1600" dirty="0" smtClean="0">
+              <a:rPr lang="es-AR" sz="1400" dirty="0" smtClean="0">
                 <a:solidFill>
                   <a:srgbClr val="000000"/>
                 </a:solidFill>
@@ -20611,7 +20611,7 @@
           <a:p>
             <a:pPr lvl="1"/>
             <a:r>
-              <a:rPr lang="es-AR" sz="1600" b="1" dirty="0" smtClean="0">
+              <a:rPr lang="es-AR" sz="1400" b="1" dirty="0" smtClean="0">
                 <a:solidFill>
                   <a:srgbClr val="00008B"/>
                 </a:solidFill>
@@ -20619,15 +20619,15 @@
               <a:t>Definir</a:t>
             </a:r>
             <a:r>
-              <a:rPr lang="es-AR" sz="1600" dirty="0" smtClean="0">
-                <a:solidFill>
-                  <a:srgbClr val="000000"/>
-                </a:solidFill>
-              </a:rPr>
-              <a:t> </a:t>
-            </a:r>
-            <a:r>
-              <a:rPr lang="es-AR" sz="1600" dirty="0" err="1" smtClean="0">
+              <a:rPr lang="es-AR" sz="1400" dirty="0" smtClean="0">
+                <a:solidFill>
+                  <a:srgbClr val="000000"/>
+                </a:solidFill>
+              </a:rPr>
+              <a:t> </a:t>
+            </a:r>
+            <a:r>
+              <a:rPr lang="es-AR" sz="1400" dirty="0" err="1" smtClean="0">
                 <a:solidFill>
                   <a:srgbClr val="000000"/>
                 </a:solidFill>
@@ -20635,15 +20635,15 @@
               <a:t>montoConDescuento</a:t>
             </a:r>
             <a:r>
-              <a:rPr lang="es-AR" sz="1600" dirty="0" smtClean="0">
-                <a:solidFill>
-                  <a:srgbClr val="000000"/>
-                </a:solidFill>
-              </a:rPr>
-              <a:t> </a:t>
-            </a:r>
-            <a:r>
-              <a:rPr lang="es-AR" sz="1600" b="1" dirty="0" smtClean="0">
+              <a:rPr lang="es-AR" sz="1400" dirty="0" smtClean="0">
+                <a:solidFill>
+                  <a:srgbClr val="000000"/>
+                </a:solidFill>
+              </a:rPr>
+              <a:t> </a:t>
+            </a:r>
+            <a:r>
+              <a:rPr lang="es-AR" sz="1400" b="1" dirty="0" smtClean="0">
                 <a:solidFill>
                   <a:srgbClr val="00008B"/>
                 </a:solidFill>
@@ -20651,15 +20651,15 @@
               <a:t>Como</a:t>
             </a:r>
             <a:r>
-              <a:rPr lang="es-AR" sz="1600" dirty="0" smtClean="0">
-                <a:solidFill>
-                  <a:srgbClr val="000000"/>
-                </a:solidFill>
-              </a:rPr>
-              <a:t> </a:t>
-            </a:r>
-            <a:r>
-              <a:rPr lang="es-AR" sz="1600" b="1" dirty="0" smtClean="0">
+              <a:rPr lang="es-AR" sz="1400" dirty="0" smtClean="0">
+                <a:solidFill>
+                  <a:srgbClr val="000000"/>
+                </a:solidFill>
+              </a:rPr>
+              <a:t> </a:t>
+            </a:r>
+            <a:r>
+              <a:rPr lang="es-AR" sz="1400" b="1" dirty="0" smtClean="0">
                 <a:solidFill>
                   <a:srgbClr val="00008B"/>
                 </a:solidFill>
@@ -20667,14 +20667,14 @@
               <a:t>Real</a:t>
             </a:r>
             <a:r>
-              <a:rPr lang="es-AR" sz="1600" dirty="0" smtClean="0">
-                <a:solidFill>
-                  <a:srgbClr val="000000"/>
-                </a:solidFill>
-              </a:rPr>
-              <a:t> </a:t>
-            </a:r>
-            <a:endParaRPr lang="es-AR" sz="1600" b="1" dirty="0" smtClean="0">
+              <a:rPr lang="es-AR" sz="1400" dirty="0" smtClean="0">
+                <a:solidFill>
+                  <a:srgbClr val="000000"/>
+                </a:solidFill>
+              </a:rPr>
+              <a:t> </a:t>
+            </a:r>
+            <a:endParaRPr lang="es-AR" sz="1400" b="1" dirty="0" smtClean="0">
               <a:solidFill>
                 <a:srgbClr val="00008B"/>
               </a:solidFill>
@@ -20683,7 +20683,7 @@
           <a:p>
             <a:pPr lvl="1"/>
             <a:r>
-              <a:rPr lang="es-AR" sz="1600" b="1" dirty="0" smtClean="0">
+              <a:rPr lang="es-AR" sz="1400" b="1" dirty="0" smtClean="0">
                 <a:solidFill>
                   <a:srgbClr val="00008B"/>
                 </a:solidFill>
@@ -20691,7 +20691,7 @@
               <a:t>Definir</a:t>
             </a:r>
             <a:r>
-              <a:rPr lang="es-AR" sz="1600" dirty="0" smtClean="0">
+              <a:rPr lang="es-AR" sz="1400" dirty="0" smtClean="0">
                 <a:solidFill>
                   <a:srgbClr val="000000"/>
                 </a:solidFill>
@@ -20699,7 +20699,7 @@
               <a:t> descuento </a:t>
             </a:r>
             <a:r>
-              <a:rPr lang="es-AR" sz="1600" b="1" dirty="0" smtClean="0">
+              <a:rPr lang="es-AR" sz="1400" b="1" dirty="0" smtClean="0">
                 <a:solidFill>
                   <a:srgbClr val="00008B"/>
                 </a:solidFill>
@@ -20707,15 +20707,15 @@
               <a:t>Como</a:t>
             </a:r>
             <a:r>
-              <a:rPr lang="es-AR" sz="1600" dirty="0" smtClean="0">
-                <a:solidFill>
-                  <a:srgbClr val="000000"/>
-                </a:solidFill>
-              </a:rPr>
-              <a:t> </a:t>
-            </a:r>
-            <a:r>
-              <a:rPr lang="es-AR" sz="1600" b="1" dirty="0" smtClean="0">
+              <a:rPr lang="es-AR" sz="1400" dirty="0" smtClean="0">
+                <a:solidFill>
+                  <a:srgbClr val="000000"/>
+                </a:solidFill>
+              </a:rPr>
+              <a:t> </a:t>
+            </a:r>
+            <a:r>
+              <a:rPr lang="es-AR" sz="1400" b="1" dirty="0" smtClean="0">
                 <a:solidFill>
                   <a:srgbClr val="00008B"/>
                 </a:solidFill>
@@ -20723,7 +20723,7 @@
               <a:t>Real</a:t>
             </a:r>
             <a:r>
-              <a:rPr lang="es-AR" sz="1600" dirty="0" smtClean="0">
+              <a:rPr lang="es-AR" sz="1400" dirty="0" smtClean="0">
                 <a:solidFill>
                   <a:srgbClr val="000000"/>
                 </a:solidFill>
@@ -20734,7 +20734,7 @@
           <a:p>
             <a:pPr lvl="1"/>
             <a:r>
-              <a:rPr lang="es-AR" sz="1600" b="1" dirty="0" smtClean="0">
+              <a:rPr lang="es-AR" sz="1400" b="1" dirty="0" smtClean="0">
                 <a:solidFill>
                   <a:srgbClr val="00008B"/>
                 </a:solidFill>
@@ -20742,7 +20742,7 @@
               <a:t>Definir</a:t>
             </a:r>
             <a:r>
-              <a:rPr lang="es-AR" sz="1600" dirty="0" smtClean="0">
+              <a:rPr lang="es-AR" sz="1400" dirty="0" smtClean="0">
                 <a:solidFill>
                   <a:srgbClr val="000000"/>
                 </a:solidFill>
@@ -20750,7 +20750,7 @@
               <a:t> cantidad </a:t>
             </a:r>
             <a:r>
-              <a:rPr lang="es-AR" sz="1600" b="1" dirty="0" smtClean="0">
+              <a:rPr lang="es-AR" sz="1400" b="1" dirty="0" smtClean="0">
                 <a:solidFill>
                   <a:srgbClr val="00008B"/>
                 </a:solidFill>
@@ -20758,15 +20758,15 @@
               <a:t>Como</a:t>
             </a:r>
             <a:r>
-              <a:rPr lang="es-AR" sz="1600" dirty="0" smtClean="0">
-                <a:solidFill>
-                  <a:srgbClr val="000000"/>
-                </a:solidFill>
-              </a:rPr>
-              <a:t> </a:t>
-            </a:r>
-            <a:r>
-              <a:rPr lang="es-AR" sz="1600" b="1" dirty="0" smtClean="0">
+              <a:rPr lang="es-AR" sz="1400" dirty="0" smtClean="0">
+                <a:solidFill>
+                  <a:srgbClr val="000000"/>
+                </a:solidFill>
+              </a:rPr>
+              <a:t> </a:t>
+            </a:r>
+            <a:r>
+              <a:rPr lang="es-AR" sz="1400" b="1" dirty="0" smtClean="0">
                 <a:solidFill>
                   <a:srgbClr val="00008B"/>
                 </a:solidFill>
@@ -20774,7 +20774,7 @@
               <a:t>Real</a:t>
             </a:r>
             <a:r>
-              <a:rPr lang="es-AR" sz="1600" dirty="0" smtClean="0">
+              <a:rPr lang="es-AR" sz="1400" dirty="0" smtClean="0">
                 <a:solidFill>
                   <a:srgbClr val="000000"/>
                 </a:solidFill>
@@ -20785,7 +20785,7 @@
           <a:p>
             <a:pPr lvl="1"/>
             <a:r>
-              <a:rPr lang="es-AR" sz="1600" b="1" dirty="0" smtClean="0">
+              <a:rPr lang="es-AR" sz="1400" b="1" dirty="0" smtClean="0">
                 <a:solidFill>
                   <a:srgbClr val="00008B"/>
                 </a:solidFill>
@@ -20793,15 +20793,15 @@
               <a:t>Definir</a:t>
             </a:r>
             <a:r>
-              <a:rPr lang="es-AR" sz="1600" dirty="0" smtClean="0">
-                <a:solidFill>
-                  <a:srgbClr val="000000"/>
-                </a:solidFill>
-              </a:rPr>
-              <a:t> </a:t>
-            </a:r>
-            <a:r>
-              <a:rPr lang="es-AR" sz="1600" dirty="0" err="1" smtClean="0">
+              <a:rPr lang="es-AR" sz="1400" dirty="0" smtClean="0">
+                <a:solidFill>
+                  <a:srgbClr val="000000"/>
+                </a:solidFill>
+              </a:rPr>
+              <a:t> </a:t>
+            </a:r>
+            <a:r>
+              <a:rPr lang="es-AR" sz="1400" dirty="0" err="1" smtClean="0">
                 <a:solidFill>
                   <a:srgbClr val="000000"/>
                 </a:solidFill>
@@ -20809,15 +20809,15 @@
               <a:t>precioTotal</a:t>
             </a:r>
             <a:r>
-              <a:rPr lang="es-AR" sz="1600" dirty="0" smtClean="0">
-                <a:solidFill>
-                  <a:srgbClr val="000000"/>
-                </a:solidFill>
-              </a:rPr>
-              <a:t> </a:t>
-            </a:r>
-            <a:r>
-              <a:rPr lang="es-AR" sz="1600" b="1" dirty="0" smtClean="0">
+              <a:rPr lang="es-AR" sz="1400" dirty="0" smtClean="0">
+                <a:solidFill>
+                  <a:srgbClr val="000000"/>
+                </a:solidFill>
+              </a:rPr>
+              <a:t> </a:t>
+            </a:r>
+            <a:r>
+              <a:rPr lang="es-AR" sz="1400" b="1" dirty="0" smtClean="0">
                 <a:solidFill>
                   <a:srgbClr val="00008B"/>
                 </a:solidFill>
@@ -20825,15 +20825,15 @@
               <a:t>Como</a:t>
             </a:r>
             <a:r>
-              <a:rPr lang="es-AR" sz="1600" dirty="0" smtClean="0">
-                <a:solidFill>
-                  <a:srgbClr val="000000"/>
-                </a:solidFill>
-              </a:rPr>
-              <a:t> </a:t>
-            </a:r>
-            <a:r>
-              <a:rPr lang="es-AR" sz="1600" b="1" dirty="0" smtClean="0">
+              <a:rPr lang="es-AR" sz="1400" dirty="0" smtClean="0">
+                <a:solidFill>
+                  <a:srgbClr val="000000"/>
+                </a:solidFill>
+              </a:rPr>
+              <a:t> </a:t>
+            </a:r>
+            <a:r>
+              <a:rPr lang="es-AR" sz="1400" b="1" dirty="0" smtClean="0">
                 <a:solidFill>
                   <a:srgbClr val="00008B"/>
                 </a:solidFill>
@@ -20841,7 +20841,7 @@
               <a:t>Real</a:t>
             </a:r>
             <a:r>
-              <a:rPr lang="es-AR" sz="1600" dirty="0" smtClean="0">
+              <a:rPr lang="es-AR" sz="1400" dirty="0" smtClean="0">
                 <a:solidFill>
                   <a:srgbClr val="000000"/>
                 </a:solidFill>
@@ -20852,7 +20852,7 @@
           <a:p>
             <a:pPr lvl="1"/>
             <a:r>
-              <a:rPr lang="es-AR" sz="1600" b="1" dirty="0" smtClean="0">
+              <a:rPr lang="es-AR" sz="1400" b="1" dirty="0" smtClean="0">
                 <a:solidFill>
                   <a:srgbClr val="00008B"/>
                 </a:solidFill>
@@ -20860,15 +20860,15 @@
               <a:t>Escribir</a:t>
             </a:r>
             <a:r>
-              <a:rPr lang="es-AR" sz="1600" dirty="0" smtClean="0">
-                <a:solidFill>
-                  <a:srgbClr val="000000"/>
-                </a:solidFill>
-              </a:rPr>
-              <a:t> </a:t>
-            </a:r>
-            <a:r>
-              <a:rPr lang="es-AR" sz="1600" dirty="0" smtClean="0">
+              <a:rPr lang="es-AR" sz="1400" dirty="0" smtClean="0">
+                <a:solidFill>
+                  <a:srgbClr val="000000"/>
+                </a:solidFill>
+              </a:rPr>
+              <a:t> </a:t>
+            </a:r>
+            <a:r>
+              <a:rPr lang="es-AR" sz="1400" dirty="0" smtClean="0">
                 <a:solidFill>
                   <a:srgbClr val="FF0000"/>
                 </a:solidFill>
@@ -20876,7 +20876,7 @@
               <a:t>"Ingresar monto: "</a:t>
             </a:r>
             <a:r>
-              <a:rPr lang="es-AR" sz="1600" dirty="0" smtClean="0">
+              <a:rPr lang="es-AR" sz="1400" dirty="0" smtClean="0">
                 <a:solidFill>
                   <a:srgbClr val="000000"/>
                 </a:solidFill>
@@ -20887,7 +20887,7 @@
           <a:p>
             <a:pPr lvl="1"/>
             <a:r>
-              <a:rPr lang="es-AR" sz="1600" b="1" dirty="0" smtClean="0">
+              <a:rPr lang="es-AR" sz="1400" b="1" dirty="0" smtClean="0">
                 <a:solidFill>
                   <a:srgbClr val="00008B"/>
                 </a:solidFill>
@@ -20895,7 +20895,7 @@
               <a:t>Leer</a:t>
             </a:r>
             <a:r>
-              <a:rPr lang="es-AR" sz="1600" dirty="0" smtClean="0">
+              <a:rPr lang="es-AR" sz="1400" dirty="0" smtClean="0">
                 <a:solidFill>
                   <a:srgbClr val="000000"/>
                 </a:solidFill>
@@ -20906,7 +20906,7 @@
           <a:p>
             <a:pPr lvl="1"/>
             <a:r>
-              <a:rPr lang="es-AR" sz="1600" b="1" dirty="0" smtClean="0">
+              <a:rPr lang="es-AR" sz="1400" b="1" dirty="0" smtClean="0">
                 <a:solidFill>
                   <a:srgbClr val="00008B"/>
                 </a:solidFill>
@@ -20914,15 +20914,15 @@
               <a:t>Escribir</a:t>
             </a:r>
             <a:r>
-              <a:rPr lang="es-AR" sz="1600" dirty="0" smtClean="0">
-                <a:solidFill>
-                  <a:srgbClr val="000000"/>
-                </a:solidFill>
-              </a:rPr>
-              <a:t> </a:t>
-            </a:r>
-            <a:r>
-              <a:rPr lang="es-AR" sz="1600" dirty="0" smtClean="0">
+              <a:rPr lang="es-AR" sz="1400" dirty="0" smtClean="0">
+                <a:solidFill>
+                  <a:srgbClr val="000000"/>
+                </a:solidFill>
+              </a:rPr>
+              <a:t> </a:t>
+            </a:r>
+            <a:r>
+              <a:rPr lang="es-AR" sz="1400" dirty="0" smtClean="0">
                 <a:solidFill>
                   <a:srgbClr val="FF0000"/>
                 </a:solidFill>
@@ -20930,7 +20930,7 @@
               <a:t>"Ingresar cantidad: "</a:t>
             </a:r>
             <a:r>
-              <a:rPr lang="es-AR" sz="1600" dirty="0" smtClean="0">
+              <a:rPr lang="es-AR" sz="1400" dirty="0" smtClean="0">
                 <a:solidFill>
                   <a:srgbClr val="000000"/>
                 </a:solidFill>
@@ -20941,7 +20941,7 @@
           <a:p>
             <a:pPr lvl="1"/>
             <a:r>
-              <a:rPr lang="es-AR" sz="1600" b="1" dirty="0" smtClean="0">
+              <a:rPr lang="es-AR" sz="1400" b="1" dirty="0" smtClean="0">
                 <a:solidFill>
                   <a:srgbClr val="00008B"/>
                 </a:solidFill>
@@ -20949,15 +20949,82 @@
               <a:t>leer</a:t>
             </a:r>
             <a:r>
-              <a:rPr lang="es-AR" sz="1600" dirty="0" smtClean="0">
+              <a:rPr lang="es-AR" sz="1400" dirty="0" smtClean="0">
                 <a:solidFill>
                   <a:srgbClr val="000000"/>
                 </a:solidFill>
               </a:rPr>
               <a:t> cantidad </a:t>
             </a:r>
-            <a:r>
-              <a:rPr lang="es-AR" sz="1600" dirty="0" err="1" smtClean="0">
+            <a:endParaRPr lang="es-AR" sz="1400" dirty="0" smtClean="0">
+              <a:solidFill>
+                <a:srgbClr val="000000"/>
+              </a:solidFill>
+            </a:endParaRPr>
+          </a:p>
+          <a:p>
+            <a:pPr lvl="1"/>
+            <a:r>
+              <a:rPr lang="es-AR" sz="1400" dirty="0" smtClean="0">
+                <a:solidFill>
+                  <a:srgbClr val="000000"/>
+                </a:solidFill>
+              </a:rPr>
+              <a:t>precioTotal </a:t>
+            </a:r>
+            <a:r>
+              <a:rPr lang="es-AR" sz="1400" b="1" dirty="0" smtClean="0">
+                <a:solidFill>
+                  <a:srgbClr val="000000"/>
+                </a:solidFill>
+              </a:rPr>
+              <a:t>=</a:t>
+            </a:r>
+            <a:r>
+              <a:rPr lang="es-AR" sz="1400" dirty="0" smtClean="0">
+                <a:solidFill>
+                  <a:srgbClr val="000000"/>
+                </a:solidFill>
+              </a:rPr>
+              <a:t> monto </a:t>
+            </a:r>
+            <a:r>
+              <a:rPr lang="es-AR" sz="1400" b="1" dirty="0" smtClean="0">
+                <a:solidFill>
+                  <a:srgbClr val="000000"/>
+                </a:solidFill>
+              </a:rPr>
+              <a:t>*</a:t>
+            </a:r>
+            <a:r>
+              <a:rPr lang="es-AR" sz="1400" dirty="0" smtClean="0">
+                <a:solidFill>
+                  <a:srgbClr val="000000"/>
+                </a:solidFill>
+              </a:rPr>
+              <a:t> cantidad </a:t>
+            </a:r>
+          </a:p>
+          <a:p>
+            <a:pPr lvl="1"/>
+            <a:r>
+              <a:rPr lang="es-AR" sz="1400" b="1" dirty="0" smtClean="0">
+                <a:solidFill>
+                  <a:srgbClr val="00008B"/>
+                </a:solidFill>
+              </a:rPr>
+              <a:t>Si</a:t>
+            </a:r>
+            <a:r>
+              <a:rPr lang="es-AR" sz="1400" dirty="0" smtClean="0">
+                <a:solidFill>
+                  <a:srgbClr val="000000"/>
+                </a:solidFill>
+              </a:rPr>
+              <a:t> </a:t>
+            </a:r>
+            <a:r>
+              <a:rPr lang="es-AR" sz="1400" dirty="0" err="1" smtClean="0">
                 <a:solidFill>
                   <a:srgbClr val="000000"/>
                 </a:solidFill>
@@ -20965,15 +21032,74 @@
               <a:t>precioTotal</a:t>
             </a:r>
             <a:r>
-              <a:rPr lang="es-AR" sz="1600" dirty="0" smtClean="0">
-                <a:solidFill>
-                  <a:srgbClr val="000000"/>
-                </a:solidFill>
-              </a:rPr>
-              <a:t> </a:t>
-            </a:r>
-            <a:r>
-              <a:rPr lang="es-AR" sz="1600" b="1" dirty="0" smtClean="0">
+              <a:rPr lang="es-AR" sz="1400" dirty="0" smtClean="0">
+                <a:solidFill>
+                  <a:srgbClr val="000000"/>
+                </a:solidFill>
+              </a:rPr>
+              <a:t> </a:t>
+            </a:r>
+            <a:r>
+              <a:rPr lang="es-AR" sz="1400" b="1" dirty="0" smtClean="0">
+                <a:solidFill>
+                  <a:srgbClr val="000000"/>
+                </a:solidFill>
+              </a:rPr>
+              <a:t>&gt;=</a:t>
+            </a:r>
+            <a:r>
+              <a:rPr lang="es-AR" sz="1400" dirty="0" smtClean="0">
+                <a:solidFill>
+                  <a:srgbClr val="000000"/>
+                </a:solidFill>
+              </a:rPr>
+              <a:t> </a:t>
+            </a:r>
+            <a:r>
+              <a:rPr lang="es-AR" sz="1400" dirty="0" smtClean="0">
+                <a:solidFill>
+                  <a:srgbClr val="A0522D"/>
+                </a:solidFill>
+              </a:rPr>
+              <a:t>1000</a:t>
+            </a:r>
+            <a:r>
+              <a:rPr lang="es-AR" sz="1400" dirty="0" smtClean="0">
+                <a:solidFill>
+                  <a:srgbClr val="000000"/>
+                </a:solidFill>
+              </a:rPr>
+              <a:t> </a:t>
+            </a:r>
+            <a:r>
+              <a:rPr lang="es-AR" sz="1400" b="1" dirty="0" smtClean="0">
+                <a:solidFill>
+                  <a:srgbClr val="00008B"/>
+                </a:solidFill>
+              </a:rPr>
+              <a:t>Entonces</a:t>
+            </a:r>
+            <a:r>
+              <a:rPr lang="es-AR" sz="1400" dirty="0" smtClean="0">
+                <a:solidFill>
+                  <a:srgbClr val="000000"/>
+                </a:solidFill>
+              </a:rPr>
+              <a:t> </a:t>
+            </a:r>
+          </a:p>
+          <a:p>
+            <a:pPr lvl="2"/>
+            <a:r>
+              <a:rPr lang="es-AR" sz="1400" dirty="0" smtClean="0">
+                <a:solidFill>
+                  <a:srgbClr val="000000"/>
+                </a:solidFill>
+              </a:rPr>
+              <a:t>descuento </a:t>
+            </a:r>
+            <a:r>
+              <a:rPr lang="es-AR" sz="1400" b="1" dirty="0" smtClean="0">
                 <a:solidFill>
                   <a:srgbClr val="000000"/>
                 </a:solidFill>
@@ -20981,15 +21107,39 @@
               <a:t>=</a:t>
             </a:r>
             <a:r>
-              <a:rPr lang="es-AR" sz="1600" dirty="0" smtClean="0">
-                <a:solidFill>
-                  <a:srgbClr val="000000"/>
-                </a:solidFill>
-              </a:rPr>
-              <a:t> monto </a:t>
-            </a:r>
-            <a:r>
-              <a:rPr lang="es-AR" sz="1600" b="1" dirty="0" smtClean="0">
+              <a:rPr lang="es-AR" sz="1400" dirty="0" smtClean="0">
+                <a:solidFill>
+                  <a:srgbClr val="000000"/>
+                </a:solidFill>
+              </a:rPr>
+              <a:t> </a:t>
+            </a:r>
+            <a:r>
+              <a:rPr lang="es-AR" sz="1400" b="1" dirty="0" smtClean="0">
+                <a:solidFill>
+                  <a:srgbClr val="000000"/>
+                </a:solidFill>
+              </a:rPr>
+              <a:t>(</a:t>
+            </a:r>
+            <a:r>
+              <a:rPr lang="es-AR" sz="1400" dirty="0" err="1" smtClean="0">
+                <a:solidFill>
+                  <a:srgbClr val="000000"/>
+                </a:solidFill>
+              </a:rPr>
+              <a:t>precioTotal</a:t>
+            </a:r>
+            <a:r>
+              <a:rPr lang="es-AR" sz="1400" dirty="0" smtClean="0">
+                <a:solidFill>
+                  <a:srgbClr val="000000"/>
+                </a:solidFill>
+              </a:rPr>
+              <a:t> </a:t>
+            </a:r>
+            <a:r>
+              <a:rPr lang="es-AR" sz="1400" b="1" dirty="0" smtClean="0">
                 <a:solidFill>
                   <a:srgbClr val="000000"/>
                 </a:solidFill>
@@ -20997,34 +21147,286 @@
               <a:t>*</a:t>
             </a:r>
             <a:r>
-              <a:rPr lang="es-AR" sz="1600" dirty="0" smtClean="0">
-                <a:solidFill>
-                  <a:srgbClr val="000000"/>
-                </a:solidFill>
-              </a:rPr>
-              <a:t> cantidad </a:t>
+              <a:rPr lang="es-AR" sz="1400" dirty="0" smtClean="0">
+                <a:solidFill>
+                  <a:srgbClr val="000000"/>
+                </a:solidFill>
+              </a:rPr>
+              <a:t> </a:t>
+            </a:r>
+            <a:r>
+              <a:rPr lang="es-AR" sz="1400" dirty="0" smtClean="0">
+                <a:solidFill>
+                  <a:srgbClr val="A0522D"/>
+                </a:solidFill>
+              </a:rPr>
+              <a:t>10</a:t>
+            </a:r>
+            <a:r>
+              <a:rPr lang="es-AR" sz="1400" b="1" dirty="0" smtClean="0">
+                <a:solidFill>
+                  <a:srgbClr val="000000"/>
+                </a:solidFill>
+              </a:rPr>
+              <a:t>)</a:t>
+            </a:r>
+            <a:r>
+              <a:rPr lang="es-AR" sz="1400" dirty="0" smtClean="0">
+                <a:solidFill>
+                  <a:srgbClr val="000000"/>
+                </a:solidFill>
+              </a:rPr>
+              <a:t> </a:t>
+            </a:r>
+            <a:r>
+              <a:rPr lang="es-AR" sz="1400" b="1" dirty="0" smtClean="0">
+                <a:solidFill>
+                  <a:srgbClr val="000000"/>
+                </a:solidFill>
+              </a:rPr>
+              <a:t>/</a:t>
+            </a:r>
+            <a:r>
+              <a:rPr lang="es-AR" sz="1400" dirty="0" smtClean="0">
+                <a:solidFill>
+                  <a:srgbClr val="A0522D"/>
+                </a:solidFill>
+              </a:rPr>
+              <a:t>100</a:t>
+            </a:r>
+            <a:r>
+              <a:rPr lang="es-AR" sz="1400" dirty="0" smtClean="0">
+                <a:solidFill>
+                  <a:srgbClr val="000000"/>
+                </a:solidFill>
+              </a:rPr>
+              <a:t> </a:t>
+            </a:r>
+          </a:p>
+          <a:p>
+            <a:pPr lvl="2"/>
+            <a:r>
+              <a:rPr lang="es-AR" sz="1400" dirty="0" err="1" smtClean="0">
+                <a:solidFill>
+                  <a:srgbClr val="000000"/>
+                </a:solidFill>
+              </a:rPr>
+              <a:t>montoConDescuento</a:t>
+            </a:r>
+            <a:r>
+              <a:rPr lang="es-AR" sz="1400" dirty="0" smtClean="0">
+                <a:solidFill>
+                  <a:srgbClr val="000000"/>
+                </a:solidFill>
+              </a:rPr>
+              <a:t> </a:t>
+            </a:r>
+            <a:r>
+              <a:rPr lang="es-AR" sz="1400" b="1" dirty="0" smtClean="0">
+                <a:solidFill>
+                  <a:srgbClr val="000000"/>
+                </a:solidFill>
+              </a:rPr>
+              <a:t>=</a:t>
+            </a:r>
+            <a:r>
+              <a:rPr lang="es-AR" sz="1400" dirty="0" smtClean="0">
+                <a:solidFill>
+                  <a:srgbClr val="000000"/>
+                </a:solidFill>
+              </a:rPr>
+              <a:t> </a:t>
+            </a:r>
+            <a:r>
+              <a:rPr lang="es-AR" sz="1400" dirty="0" err="1" smtClean="0">
+                <a:solidFill>
+                  <a:srgbClr val="000000"/>
+                </a:solidFill>
+              </a:rPr>
+              <a:t>precioTotal</a:t>
+            </a:r>
+            <a:r>
+              <a:rPr lang="es-AR" sz="1400" dirty="0" smtClean="0">
+                <a:solidFill>
+                  <a:srgbClr val="000000"/>
+                </a:solidFill>
+              </a:rPr>
+              <a:t> </a:t>
+            </a:r>
+            <a:r>
+              <a:rPr lang="es-AR" sz="1400" b="1" dirty="0" smtClean="0">
+                <a:solidFill>
+                  <a:srgbClr val="000000"/>
+                </a:solidFill>
+              </a:rPr>
+              <a:t>-</a:t>
+            </a:r>
+            <a:r>
+              <a:rPr lang="es-AR" sz="1400" dirty="0" smtClean="0">
+                <a:solidFill>
+                  <a:srgbClr val="000000"/>
+                </a:solidFill>
+              </a:rPr>
+              <a:t> descuento </a:t>
+            </a:r>
+          </a:p>
+          <a:p>
+            <a:pPr lvl="2"/>
+            <a:r>
+              <a:rPr lang="es-AR" sz="1400" b="1" dirty="0" smtClean="0">
+                <a:solidFill>
+                  <a:srgbClr val="00008B"/>
+                </a:solidFill>
+              </a:rPr>
+              <a:t>Escribir</a:t>
+            </a:r>
+            <a:r>
+              <a:rPr lang="es-AR" sz="1400" dirty="0" smtClean="0">
+                <a:solidFill>
+                  <a:srgbClr val="000000"/>
+                </a:solidFill>
+              </a:rPr>
+              <a:t> </a:t>
+            </a:r>
+            <a:r>
+              <a:rPr lang="es-AR" sz="1400" dirty="0" smtClean="0">
+                <a:solidFill>
+                  <a:srgbClr val="FF0000"/>
+                </a:solidFill>
+              </a:rPr>
+              <a:t>"Por gastar más de 1000 </a:t>
+            </a:r>
+            <a:r>
+              <a:rPr lang="es-AR" sz="1400" dirty="0" err="1" smtClean="0">
+                <a:solidFill>
+                  <a:srgbClr val="FF0000"/>
+                </a:solidFill>
+              </a:rPr>
+              <a:t>Ud</a:t>
+            </a:r>
+            <a:r>
+              <a:rPr lang="es-AR" sz="1400" dirty="0" smtClean="0">
+                <a:solidFill>
+                  <a:srgbClr val="FF0000"/>
+                </a:solidFill>
+              </a:rPr>
+              <a:t> tiene un 10% de descuento"</a:t>
+            </a:r>
+            <a:r>
+              <a:rPr lang="es-AR" sz="1400" dirty="0" smtClean="0">
+                <a:solidFill>
+                  <a:srgbClr val="000000"/>
+                </a:solidFill>
+              </a:rPr>
+              <a:t> </a:t>
+            </a:r>
+          </a:p>
+          <a:p>
+            <a:pPr lvl="2"/>
+            <a:r>
+              <a:rPr lang="es-AR" sz="1400" b="1" dirty="0" smtClean="0">
+                <a:solidFill>
+                  <a:srgbClr val="00008B"/>
+                </a:solidFill>
+              </a:rPr>
+              <a:t>Escribir</a:t>
+            </a:r>
+            <a:r>
+              <a:rPr lang="es-AR" sz="1400" dirty="0" smtClean="0">
+                <a:solidFill>
+                  <a:srgbClr val="000000"/>
+                </a:solidFill>
+              </a:rPr>
+              <a:t> </a:t>
+            </a:r>
+            <a:r>
+              <a:rPr lang="es-AR" sz="1400" dirty="0" smtClean="0">
+                <a:solidFill>
+                  <a:srgbClr val="FF0000"/>
+                </a:solidFill>
+              </a:rPr>
+              <a:t>"El monto a pagar es: "</a:t>
+            </a:r>
+            <a:r>
+              <a:rPr lang="es-AR" sz="1400" dirty="0" smtClean="0">
+                <a:solidFill>
+                  <a:srgbClr val="000000"/>
+                </a:solidFill>
+              </a:rPr>
+              <a:t> </a:t>
+            </a:r>
+            <a:r>
+              <a:rPr lang="es-AR" sz="1400" dirty="0" err="1" smtClean="0">
+                <a:solidFill>
+                  <a:srgbClr val="000000"/>
+                </a:solidFill>
+              </a:rPr>
+              <a:t>montoConDescuento</a:t>
+            </a:r>
+            <a:r>
+              <a:rPr lang="es-AR" sz="1400" dirty="0" smtClean="0">
+                <a:solidFill>
+                  <a:srgbClr val="000000"/>
+                </a:solidFill>
+              </a:rPr>
+              <a:t> </a:t>
             </a:r>
           </a:p>
           <a:p>
             <a:pPr lvl="1"/>
             <a:r>
-              <a:rPr lang="es-AR" sz="1600" b="1" dirty="0" smtClean="0">
+              <a:rPr lang="es-AR" sz="1400" b="1" dirty="0" smtClean="0">
                 <a:solidFill>
                   <a:srgbClr val="00008B"/>
                 </a:solidFill>
               </a:rPr>
-              <a:t>Si</a:t>
-            </a:r>
-            <a:r>
-              <a:rPr lang="es-AR" sz="1600" dirty="0" smtClean="0">
-                <a:solidFill>
-                  <a:srgbClr val="000000"/>
-                </a:solidFill>
-              </a:rPr>
-              <a:t> </a:t>
-            </a:r>
-            <a:r>
-              <a:rPr lang="es-AR" sz="1600" dirty="0" err="1" smtClean="0">
+              <a:t>Sino</a:t>
+            </a:r>
+            <a:r>
+              <a:rPr lang="es-AR" sz="1400" dirty="0" smtClean="0">
+                <a:solidFill>
+                  <a:srgbClr val="000000"/>
+                </a:solidFill>
+              </a:rPr>
+              <a:t> </a:t>
+            </a:r>
+          </a:p>
+          <a:p>
+            <a:pPr lvl="2"/>
+            <a:r>
+              <a:rPr lang="es-AR" sz="1400" b="1" dirty="0" smtClean="0">
+                <a:solidFill>
+                  <a:srgbClr val="00008B"/>
+                </a:solidFill>
+              </a:rPr>
+              <a:t>Escribir</a:t>
+            </a:r>
+            <a:r>
+              <a:rPr lang="es-AR" sz="1400" dirty="0" smtClean="0">
+                <a:solidFill>
+                  <a:srgbClr val="000000"/>
+                </a:solidFill>
+              </a:rPr>
+              <a:t> </a:t>
+            </a:r>
+            <a:r>
+              <a:rPr lang="es-AR" sz="1400" dirty="0" smtClean="0">
+                <a:solidFill>
+                  <a:srgbClr val="FF0000"/>
+                </a:solidFill>
+              </a:rPr>
+              <a:t>"Ud. no tiene descuento. El monto a pagar es: "</a:t>
+            </a:r>
+            <a:r>
+              <a:rPr lang="es-AR" sz="1400" dirty="0" smtClean="0">
+                <a:solidFill>
+                  <a:srgbClr val="000000"/>
+                </a:solidFill>
+              </a:rPr>
+              <a:t> </a:t>
+            </a:r>
+            <a:r>
+              <a:rPr lang="es-AR" sz="1400" dirty="0" err="1" smtClean="0">
                 <a:solidFill>
                   <a:srgbClr val="000000"/>
                 </a:solidFill>
@@ -21032,450 +21434,66 @@
               <a:t>precioTotal</a:t>
             </a:r>
             <a:r>
-              <a:rPr lang="es-AR" sz="1600" dirty="0" smtClean="0">
-                <a:solidFill>
-                  <a:srgbClr val="000000"/>
-                </a:solidFill>
-              </a:rPr>
-              <a:t> </a:t>
-            </a:r>
-            <a:r>
-              <a:rPr lang="es-AR" sz="1600" b="1" dirty="0" smtClean="0">
-                <a:solidFill>
-                  <a:srgbClr val="000000"/>
-                </a:solidFill>
-              </a:rPr>
-              <a:t>&gt;=</a:t>
-            </a:r>
-            <a:r>
-              <a:rPr lang="es-AR" sz="1600" dirty="0" smtClean="0">
-                <a:solidFill>
-                  <a:srgbClr val="000000"/>
-                </a:solidFill>
-              </a:rPr>
-              <a:t> </a:t>
-            </a:r>
-            <a:r>
-              <a:rPr lang="es-AR" sz="1600" dirty="0" smtClean="0">
-                <a:solidFill>
-                  <a:srgbClr val="A0522D"/>
-                </a:solidFill>
-              </a:rPr>
-              <a:t>1000</a:t>
-            </a:r>
-            <a:r>
-              <a:rPr lang="es-AR" sz="1600" dirty="0" smtClean="0">
-                <a:solidFill>
-                  <a:srgbClr val="000000"/>
-                </a:solidFill>
-              </a:rPr>
-              <a:t> </a:t>
-            </a:r>
-            <a:r>
-              <a:rPr lang="es-AR" sz="1600" b="1" dirty="0" smtClean="0">
+              <a:rPr lang="es-AR" sz="1400" dirty="0" smtClean="0">
+                <a:solidFill>
+                  <a:srgbClr val="000000"/>
+                </a:solidFill>
+              </a:rPr>
+              <a:t> </a:t>
+            </a:r>
+          </a:p>
+          <a:p>
+            <a:r>
+              <a:rPr lang="es-AR" sz="1400" b="1" dirty="0">
                 <a:solidFill>
                   <a:srgbClr val="00008B"/>
                 </a:solidFill>
               </a:rPr>
-              <a:t>Entonces</a:t>
-            </a:r>
-            <a:r>
-              <a:rPr lang="es-AR" sz="1600" dirty="0" smtClean="0">
-                <a:solidFill>
-                  <a:srgbClr val="000000"/>
-                </a:solidFill>
-              </a:rPr>
-              <a:t> </a:t>
-            </a:r>
-          </a:p>
-          <a:p>
-            <a:pPr lvl="2"/>
-            <a:r>
-              <a:rPr lang="es-AR" sz="1600" dirty="0" smtClean="0">
-                <a:solidFill>
-                  <a:srgbClr val="000000"/>
-                </a:solidFill>
-              </a:rPr>
-              <a:t>descuento </a:t>
-            </a:r>
-            <a:r>
-              <a:rPr lang="es-AR" sz="1600" b="1" dirty="0" smtClean="0">
-                <a:solidFill>
-                  <a:srgbClr val="000000"/>
-                </a:solidFill>
-              </a:rPr>
-              <a:t>=</a:t>
-            </a:r>
-            <a:r>
-              <a:rPr lang="es-AR" sz="1600" dirty="0" smtClean="0">
-                <a:solidFill>
-                  <a:srgbClr val="000000"/>
-                </a:solidFill>
-              </a:rPr>
-              <a:t> </a:t>
-            </a:r>
-            <a:r>
-              <a:rPr lang="es-AR" sz="1600" b="1" dirty="0" smtClean="0">
-                <a:solidFill>
-                  <a:srgbClr val="000000"/>
-                </a:solidFill>
-              </a:rPr>
-              <a:t>(</a:t>
-            </a:r>
-            <a:r>
-              <a:rPr lang="es-AR" sz="1600" dirty="0" err="1" smtClean="0">
-                <a:solidFill>
-                  <a:srgbClr val="000000"/>
-                </a:solidFill>
-              </a:rPr>
-              <a:t>precioTotal</a:t>
-            </a:r>
-            <a:r>
-              <a:rPr lang="es-AR" sz="1600" dirty="0" smtClean="0">
-                <a:solidFill>
-                  <a:srgbClr val="000000"/>
-                </a:solidFill>
-              </a:rPr>
-              <a:t> </a:t>
-            </a:r>
-            <a:r>
-              <a:rPr lang="es-AR" sz="1600" b="1" dirty="0" smtClean="0">
-                <a:solidFill>
-                  <a:srgbClr val="000000"/>
-                </a:solidFill>
-              </a:rPr>
-              <a:t>*</a:t>
-            </a:r>
-            <a:r>
-              <a:rPr lang="es-AR" sz="1600" dirty="0" smtClean="0">
-                <a:solidFill>
-                  <a:srgbClr val="000000"/>
-                </a:solidFill>
-              </a:rPr>
-              <a:t> </a:t>
-            </a:r>
-            <a:r>
-              <a:rPr lang="es-AR" sz="1600" dirty="0" smtClean="0">
-                <a:solidFill>
-                  <a:srgbClr val="A0522D"/>
-                </a:solidFill>
-              </a:rPr>
-              <a:t>10</a:t>
-            </a:r>
-            <a:r>
-              <a:rPr lang="es-AR" sz="1600" b="1" dirty="0" smtClean="0">
-                <a:solidFill>
-                  <a:srgbClr val="000000"/>
-                </a:solidFill>
-              </a:rPr>
-              <a:t>)</a:t>
-            </a:r>
-            <a:r>
-              <a:rPr lang="es-AR" sz="1600" dirty="0" smtClean="0">
-                <a:solidFill>
-                  <a:srgbClr val="000000"/>
-                </a:solidFill>
-              </a:rPr>
-              <a:t> </a:t>
-            </a:r>
-            <a:r>
-              <a:rPr lang="es-AR" sz="1600" b="1" dirty="0" smtClean="0">
-                <a:solidFill>
-                  <a:srgbClr val="000000"/>
-                </a:solidFill>
-              </a:rPr>
-              <a:t>/</a:t>
-            </a:r>
-            <a:r>
-              <a:rPr lang="es-AR" sz="1600" dirty="0" smtClean="0">
-                <a:solidFill>
-                  <a:srgbClr val="A0522D"/>
-                </a:solidFill>
-              </a:rPr>
-              <a:t>100</a:t>
-            </a:r>
-            <a:r>
-              <a:rPr lang="es-AR" sz="1600" dirty="0" smtClean="0">
-                <a:solidFill>
-                  <a:srgbClr val="000000"/>
-                </a:solidFill>
-              </a:rPr>
-              <a:t> </a:t>
-            </a:r>
-          </a:p>
-          <a:p>
-            <a:pPr lvl="2"/>
-            <a:r>
-              <a:rPr lang="es-AR" sz="1600" dirty="0" err="1" smtClean="0">
-                <a:solidFill>
-                  <a:srgbClr val="000000"/>
-                </a:solidFill>
-              </a:rPr>
-              <a:t>montoConDescuento</a:t>
-            </a:r>
-            <a:r>
-              <a:rPr lang="es-AR" sz="1600" dirty="0" smtClean="0">
-                <a:solidFill>
-                  <a:srgbClr val="000000"/>
-                </a:solidFill>
-              </a:rPr>
-              <a:t> </a:t>
-            </a:r>
-            <a:r>
-              <a:rPr lang="es-AR" sz="1600" b="1" dirty="0" smtClean="0">
-                <a:solidFill>
-                  <a:srgbClr val="000000"/>
-                </a:solidFill>
-              </a:rPr>
-              <a:t>=</a:t>
-            </a:r>
-            <a:r>
-              <a:rPr lang="es-AR" sz="1600" dirty="0" smtClean="0">
-                <a:solidFill>
-                  <a:srgbClr val="000000"/>
-                </a:solidFill>
-              </a:rPr>
-              <a:t> </a:t>
-            </a:r>
-            <a:r>
-              <a:rPr lang="es-AR" sz="1600" dirty="0" err="1" smtClean="0">
-                <a:solidFill>
-                  <a:srgbClr val="000000"/>
-                </a:solidFill>
-              </a:rPr>
-              <a:t>precioTotal</a:t>
-            </a:r>
-            <a:r>
-              <a:rPr lang="es-AR" sz="1600" dirty="0" smtClean="0">
-                <a:solidFill>
-                  <a:srgbClr val="000000"/>
-                </a:solidFill>
-              </a:rPr>
-              <a:t> </a:t>
-            </a:r>
-            <a:r>
-              <a:rPr lang="es-AR" sz="1600" b="1" dirty="0" smtClean="0">
-                <a:solidFill>
-                  <a:srgbClr val="000000"/>
-                </a:solidFill>
-              </a:rPr>
-              <a:t>-</a:t>
-            </a:r>
-            <a:r>
-              <a:rPr lang="es-AR" sz="1600" dirty="0" smtClean="0">
-                <a:solidFill>
-                  <a:srgbClr val="000000"/>
-                </a:solidFill>
-              </a:rPr>
-              <a:t> descuento </a:t>
-            </a:r>
-          </a:p>
-          <a:p>
-            <a:pPr lvl="2"/>
-            <a:r>
-              <a:rPr lang="es-AR" sz="1600" b="1" dirty="0" smtClean="0">
+              <a:t> </a:t>
+            </a:r>
+            <a:r>
+              <a:rPr lang="es-AR" sz="1400" b="1" dirty="0" smtClean="0">
                 <a:solidFill>
                   <a:srgbClr val="00008B"/>
                 </a:solidFill>
               </a:rPr>
-              <a:t>Escribir</a:t>
-            </a:r>
-            <a:r>
-              <a:rPr lang="es-AR" sz="1600" dirty="0" smtClean="0">
-                <a:solidFill>
-                  <a:srgbClr val="000000"/>
-                </a:solidFill>
-              </a:rPr>
-              <a:t> </a:t>
-            </a:r>
-            <a:r>
-              <a:rPr lang="es-AR" sz="1600" dirty="0" smtClean="0">
-                <a:solidFill>
-                  <a:srgbClr val="FF0000"/>
-                </a:solidFill>
-              </a:rPr>
-              <a:t>"Por gastar más de 1000 </a:t>
-            </a:r>
-            <a:r>
-              <a:rPr lang="es-AR" sz="1600" dirty="0" err="1" smtClean="0">
-                <a:solidFill>
-                  <a:srgbClr val="FF0000"/>
-                </a:solidFill>
-              </a:rPr>
-              <a:t>Ud</a:t>
-            </a:r>
-            <a:r>
-              <a:rPr lang="es-AR" sz="1600" dirty="0" smtClean="0">
-                <a:solidFill>
-                  <a:srgbClr val="FF0000"/>
-                </a:solidFill>
-              </a:rPr>
-              <a:t> tiene un 10% de descuento"</a:t>
-            </a:r>
-            <a:r>
-              <a:rPr lang="es-AR" sz="1600" dirty="0" smtClean="0">
-                <a:solidFill>
-                  <a:srgbClr val="000000"/>
-                </a:solidFill>
-              </a:rPr>
-              <a:t> </a:t>
-            </a:r>
-          </a:p>
-          <a:p>
-            <a:pPr lvl="2"/>
-            <a:r>
-              <a:rPr lang="es-AR" sz="1600" b="1" dirty="0" smtClean="0">
+              <a:t>          </a:t>
+            </a:r>
+            <a:r>
+              <a:rPr lang="es-AR" sz="1400" b="1" dirty="0" smtClean="0">
                 <a:solidFill>
                   <a:srgbClr val="00008B"/>
                 </a:solidFill>
               </a:rPr>
-              <a:t>Escribir</a:t>
-            </a:r>
-            <a:r>
-              <a:rPr lang="es-AR" sz="1600" dirty="0" smtClean="0">
-                <a:solidFill>
-                  <a:srgbClr val="000000"/>
-                </a:solidFill>
-              </a:rPr>
-              <a:t> </a:t>
-            </a:r>
-            <a:r>
-              <a:rPr lang="es-AR" sz="1600" dirty="0" smtClean="0">
-                <a:solidFill>
-                  <a:srgbClr val="FF0000"/>
-                </a:solidFill>
-              </a:rPr>
-              <a:t>"El monto a pagar es: "</a:t>
-            </a:r>
-            <a:r>
-              <a:rPr lang="es-AR" sz="1600" dirty="0" smtClean="0">
-                <a:solidFill>
-                  <a:srgbClr val="000000"/>
-                </a:solidFill>
-              </a:rPr>
-              <a:t> </a:t>
-            </a:r>
-            <a:r>
-              <a:rPr lang="es-AR" sz="1600" dirty="0" err="1" smtClean="0">
-                <a:solidFill>
-                  <a:srgbClr val="000000"/>
-                </a:solidFill>
-              </a:rPr>
-              <a:t>montoConDescuento</a:t>
-            </a:r>
-            <a:r>
-              <a:rPr lang="es-AR" sz="1600" dirty="0" smtClean="0">
-                <a:solidFill>
-                  <a:srgbClr val="000000"/>
-                </a:solidFill>
-              </a:rPr>
-              <a:t> </a:t>
-            </a:r>
-          </a:p>
-          <a:p>
-            <a:pPr lvl="1"/>
-            <a:r>
-              <a:rPr lang="es-AR" sz="1600" b="1" dirty="0" smtClean="0">
+              <a:t>FinSi</a:t>
+            </a:r>
+            <a:r>
+              <a:rPr lang="es-AR" sz="1400" dirty="0" smtClean="0">
+                <a:solidFill>
+                  <a:srgbClr val="000000"/>
+                </a:solidFill>
+              </a:rPr>
+              <a:t> </a:t>
+            </a:r>
+          </a:p>
+          <a:p>
+            <a:r>
+              <a:rPr lang="es-AR" sz="1400" b="1" dirty="0" smtClean="0">
                 <a:solidFill>
                   <a:srgbClr val="00008B"/>
                 </a:solidFill>
               </a:rPr>
-              <a:t>Sino</a:t>
-            </a:r>
-            <a:r>
-              <a:rPr lang="es-AR" sz="1600" dirty="0" smtClean="0">
-                <a:solidFill>
-                  <a:srgbClr val="000000"/>
-                </a:solidFill>
-              </a:rPr>
-              <a:t> </a:t>
-            </a:r>
-          </a:p>
-          <a:p>
-            <a:pPr lvl="2"/>
-            <a:r>
-              <a:rPr lang="es-AR" sz="1600" b="1" dirty="0" smtClean="0">
-                <a:solidFill>
-                  <a:srgbClr val="00008B"/>
-                </a:solidFill>
-              </a:rPr>
-              <a:t>Escribir</a:t>
-            </a:r>
-            <a:r>
-              <a:rPr lang="es-AR" sz="1600" dirty="0" smtClean="0">
-                <a:solidFill>
-                  <a:srgbClr val="000000"/>
-                </a:solidFill>
-              </a:rPr>
-              <a:t> </a:t>
-            </a:r>
-            <a:r>
-              <a:rPr lang="es-AR" sz="1600" dirty="0" smtClean="0">
-                <a:solidFill>
-                  <a:srgbClr val="FF0000"/>
-                </a:solidFill>
-              </a:rPr>
-              <a:t>"Ud. no tiene descuento. El monto a pagar es: "</a:t>
-            </a:r>
-            <a:r>
-              <a:rPr lang="es-AR" sz="1600" dirty="0" smtClean="0">
-                <a:solidFill>
-                  <a:srgbClr val="000000"/>
-                </a:solidFill>
-              </a:rPr>
-              <a:t> </a:t>
-            </a:r>
-            <a:r>
-              <a:rPr lang="es-AR" sz="1600" dirty="0" err="1" smtClean="0">
-                <a:solidFill>
-                  <a:srgbClr val="000000"/>
-                </a:solidFill>
-              </a:rPr>
-              <a:t>precioTotal</a:t>
-            </a:r>
-            <a:r>
-              <a:rPr lang="es-AR" sz="1600" dirty="0" smtClean="0">
-                <a:solidFill>
-                  <a:srgbClr val="000000"/>
-                </a:solidFill>
-              </a:rPr>
-              <a:t> </a:t>
-            </a:r>
-          </a:p>
-          <a:p>
-            <a:r>
-              <a:rPr lang="es-AR" sz="1600" b="1" dirty="0" err="1" smtClean="0">
-                <a:solidFill>
-                  <a:srgbClr val="00008B"/>
-                </a:solidFill>
-              </a:rPr>
-              <a:t>FinSi</a:t>
-            </a:r>
-            <a:r>
-              <a:rPr lang="es-AR" sz="1600" dirty="0" smtClean="0">
-                <a:solidFill>
-                  <a:srgbClr val="000000"/>
-                </a:solidFill>
-              </a:rPr>
-              <a:t> </a:t>
-            </a:r>
-            <a:r>
-              <a:rPr lang="es-AR" sz="1600" b="1" dirty="0" err="1" smtClean="0">
-                <a:solidFill>
-                  <a:srgbClr val="00008B"/>
-                </a:solidFill>
-              </a:rPr>
               <a:t>FinAlgoritmo</a:t>
             </a:r>
             <a:r>
-              <a:rPr lang="es-AR" sz="1600" dirty="0" smtClean="0">
-                <a:solidFill>
-                  <a:srgbClr val="000000"/>
-                </a:solidFill>
-              </a:rPr>
-              <a:t> </a:t>
-            </a:r>
-            <a:endParaRPr lang="es-AR" sz="1600" dirty="0"/>
+              <a:rPr lang="es-AR" sz="1400" dirty="0" smtClean="0">
+                <a:solidFill>
+                  <a:srgbClr val="000000"/>
+                </a:solidFill>
+              </a:rPr>
+              <a:t> </a:t>
+            </a:r>
+            <a:endParaRPr lang="es-AR" sz="1400" dirty="0"/>
           </a:p>
         </p:txBody>
       </p:sp>
@@ -21613,28 +21631,28 @@
                 <a:gridCol w="4320944">
                   <a:extLst>
                     <a:ext uri="{9D8B030D-6E8A-4147-A177-3AD203B41FA5}">
-                      <a16:colId xmlns:a16="http://schemas.microsoft.com/office/drawing/2014/main" val="20000"/>
+                      <a16:colId xmlns:a16="http://schemas.microsoft.com/office/drawing/2014/main" xmlns="" val="20000"/>
                     </a:ext>
                   </a:extLst>
                 </a:gridCol>
                 <a:gridCol w="968873">
                   <a:extLst>
                     <a:ext uri="{9D8B030D-6E8A-4147-A177-3AD203B41FA5}">
-                      <a16:colId xmlns:a16="http://schemas.microsoft.com/office/drawing/2014/main" val="20001"/>
+                      <a16:colId xmlns:a16="http://schemas.microsoft.com/office/drawing/2014/main" xmlns="" val="20001"/>
                     </a:ext>
                   </a:extLst>
                 </a:gridCol>
                 <a:gridCol w="1309892">
                   <a:extLst>
                     <a:ext uri="{9D8B030D-6E8A-4147-A177-3AD203B41FA5}">
-                      <a16:colId xmlns:a16="http://schemas.microsoft.com/office/drawing/2014/main" val="20002"/>
+                      <a16:colId xmlns:a16="http://schemas.microsoft.com/office/drawing/2014/main" xmlns="" val="20002"/>
                     </a:ext>
                   </a:extLst>
                 </a:gridCol>
                 <a:gridCol w="2163289">
                   <a:extLst>
                     <a:ext uri="{9D8B030D-6E8A-4147-A177-3AD203B41FA5}">
-                      <a16:colId xmlns:a16="http://schemas.microsoft.com/office/drawing/2014/main" val="20003"/>
+                      <a16:colId xmlns:a16="http://schemas.microsoft.com/office/drawing/2014/main" xmlns="" val="20003"/>
                     </a:ext>
                   </a:extLst>
                 </a:gridCol>
@@ -21702,7 +21720,7 @@
                 </a:tc>
                 <a:extLst>
                   <a:ext uri="{0D108BD9-81ED-4DB2-BD59-A6C34878D82A}">
-                    <a16:rowId xmlns:a16="http://schemas.microsoft.com/office/drawing/2014/main" val="10000"/>
+                    <a16:rowId xmlns:a16="http://schemas.microsoft.com/office/drawing/2014/main" xmlns="" val="10000"/>
                   </a:ext>
                 </a:extLst>
               </a:tr>
@@ -22721,7 +22739,7 @@
                 </a:tc>
                 <a:extLst>
                   <a:ext uri="{0D108BD9-81ED-4DB2-BD59-A6C34878D82A}">
-                    <a16:rowId xmlns:a16="http://schemas.microsoft.com/office/drawing/2014/main" val="10001"/>
+                    <a16:rowId xmlns:a16="http://schemas.microsoft.com/office/drawing/2014/main" xmlns="" val="10001"/>
                   </a:ext>
                 </a:extLst>
               </a:tr>
@@ -22878,7 +22896,7 @@
                 </a:tc>
                 <a:extLst>
                   <a:ext uri="{0D108BD9-81ED-4DB2-BD59-A6C34878D82A}">
-                    <a16:rowId xmlns:a16="http://schemas.microsoft.com/office/drawing/2014/main" val="10002"/>
+                    <a16:rowId xmlns:a16="http://schemas.microsoft.com/office/drawing/2014/main" xmlns="" val="10002"/>
                   </a:ext>
                 </a:extLst>
               </a:tr>
@@ -22974,7 +22992,7 @@
                 </a:tc>
                 <a:extLst>
                   <a:ext uri="{0D108BD9-81ED-4DB2-BD59-A6C34878D82A}">
-                    <a16:rowId xmlns:a16="http://schemas.microsoft.com/office/drawing/2014/main" val="10003"/>
+                    <a16:rowId xmlns:a16="http://schemas.microsoft.com/office/drawing/2014/main" xmlns="" val="10003"/>
                   </a:ext>
                 </a:extLst>
               </a:tr>
@@ -23120,7 +23138,7 @@
                 </a:tc>
                 <a:extLst>
                   <a:ext uri="{0D108BD9-81ED-4DB2-BD59-A6C34878D82A}">
-                    <a16:rowId xmlns:a16="http://schemas.microsoft.com/office/drawing/2014/main" val="10004"/>
+                    <a16:rowId xmlns:a16="http://schemas.microsoft.com/office/drawing/2014/main" xmlns="" val="10004"/>
                   </a:ext>
                 </a:extLst>
               </a:tr>
@@ -23167,7 +23185,7 @@
                 </a:tc>
                 <a:extLst>
                   <a:ext uri="{0D108BD9-81ED-4DB2-BD59-A6C34878D82A}">
-                    <a16:rowId xmlns:a16="http://schemas.microsoft.com/office/drawing/2014/main" val="10005"/>
+                    <a16:rowId xmlns:a16="http://schemas.microsoft.com/office/drawing/2014/main" xmlns="" val="10005"/>
                   </a:ext>
                 </a:extLst>
               </a:tr>
@@ -23214,7 +23232,7 @@
                 </a:tc>
                 <a:extLst>
                   <a:ext uri="{0D108BD9-81ED-4DB2-BD59-A6C34878D82A}">
-                    <a16:rowId xmlns:a16="http://schemas.microsoft.com/office/drawing/2014/main" val="10006"/>
+                    <a16:rowId xmlns:a16="http://schemas.microsoft.com/office/drawing/2014/main" xmlns="" val="10006"/>
                   </a:ext>
                 </a:extLst>
               </a:tr>
@@ -24904,21 +24922,21 @@
                 <a:gridCol w="3486150">
                   <a:extLst>
                     <a:ext uri="{9D8B030D-6E8A-4147-A177-3AD203B41FA5}">
-                      <a16:colId xmlns:a16="http://schemas.microsoft.com/office/drawing/2014/main" val="20000"/>
+                      <a16:colId xmlns:a16="http://schemas.microsoft.com/office/drawing/2014/main" xmlns="" val="20000"/>
                     </a:ext>
                   </a:extLst>
                 </a:gridCol>
                 <a:gridCol w="2062716">
                   <a:extLst>
                     <a:ext uri="{9D8B030D-6E8A-4147-A177-3AD203B41FA5}">
-                      <a16:colId xmlns:a16="http://schemas.microsoft.com/office/drawing/2014/main" val="20001"/>
+                      <a16:colId xmlns:a16="http://schemas.microsoft.com/office/drawing/2014/main" xmlns="" val="20001"/>
                     </a:ext>
                   </a:extLst>
                 </a:gridCol>
                 <a:gridCol w="2337834">
                   <a:extLst>
                     <a:ext uri="{9D8B030D-6E8A-4147-A177-3AD203B41FA5}">
-                      <a16:colId xmlns:a16="http://schemas.microsoft.com/office/drawing/2014/main" val="20002"/>
+                      <a16:colId xmlns:a16="http://schemas.microsoft.com/office/drawing/2014/main" xmlns="" val="20002"/>
                     </a:ext>
                   </a:extLst>
                 </a:gridCol>
@@ -24975,7 +24993,7 @@
                 </a:tc>
                 <a:extLst>
                   <a:ext uri="{0D108BD9-81ED-4DB2-BD59-A6C34878D82A}">
-                    <a16:rowId xmlns:a16="http://schemas.microsoft.com/office/drawing/2014/main" val="10000"/>
+                    <a16:rowId xmlns:a16="http://schemas.microsoft.com/office/drawing/2014/main" xmlns="" val="10000"/>
                   </a:ext>
                 </a:extLst>
               </a:tr>
@@ -25530,7 +25548,7 @@
                 </a:tc>
                 <a:extLst>
                   <a:ext uri="{0D108BD9-81ED-4DB2-BD59-A6C34878D82A}">
-                    <a16:rowId xmlns:a16="http://schemas.microsoft.com/office/drawing/2014/main" val="10001"/>
+                    <a16:rowId xmlns:a16="http://schemas.microsoft.com/office/drawing/2014/main" xmlns="" val="10001"/>
                   </a:ext>
                 </a:extLst>
               </a:tr>
@@ -25579,7 +25597,7 @@
                 </a:tc>
                 <a:extLst>
                   <a:ext uri="{0D108BD9-81ED-4DB2-BD59-A6C34878D82A}">
-                    <a16:rowId xmlns:a16="http://schemas.microsoft.com/office/drawing/2014/main" val="10002"/>
+                    <a16:rowId xmlns:a16="http://schemas.microsoft.com/office/drawing/2014/main" xmlns="" val="10002"/>
                   </a:ext>
                 </a:extLst>
               </a:tr>
@@ -25628,7 +25646,7 @@
                 </a:tc>
                 <a:extLst>
                   <a:ext uri="{0D108BD9-81ED-4DB2-BD59-A6C34878D82A}">
-                    <a16:rowId xmlns:a16="http://schemas.microsoft.com/office/drawing/2014/main" val="10003"/>
+                    <a16:rowId xmlns:a16="http://schemas.microsoft.com/office/drawing/2014/main" xmlns="" val="10003"/>
                   </a:ext>
                 </a:extLst>
               </a:tr>
@@ -26737,15 +26755,15 @@
                   <a:srgbClr val="000000"/>
                 </a:solidFill>
               </a:rPr>
-              <a:t> </a:t>
-            </a:r>
-            <a:r>
-              <a:rPr lang="es-AR" sz="1200" dirty="0" err="1" smtClean="0">
-                <a:solidFill>
-                  <a:srgbClr val="000000"/>
-                </a:solidFill>
-              </a:rPr>
-              <a:t>usrIngresado</a:t>
+              <a:t> usrIngresado </a:t>
+            </a:r>
+            <a:r>
+              <a:rPr lang="es-AR" sz="1200" b="1" dirty="0" smtClean="0">
+                <a:solidFill>
+                  <a:srgbClr val="000000"/>
+                </a:solidFill>
+              </a:rPr>
+              <a:t>&amp;</a:t>
             </a:r>
             <a:r>
               <a:rPr lang="es-AR" sz="1200" dirty="0" smtClean="0">
@@ -26753,7 +26771,7 @@
                   <a:srgbClr val="000000"/>
                 </a:solidFill>
               </a:rPr>
-              <a:t> </a:t>
+              <a:t> clave </a:t>
             </a:r>
             <a:r>
               <a:rPr lang="es-AR" sz="1200" b="1" dirty="0" smtClean="0">
@@ -26761,7 +26779,7 @@
                   <a:srgbClr val="000000"/>
                 </a:solidFill>
               </a:rPr>
-              <a:t>&amp;</a:t>
+              <a:t>=</a:t>
             </a:r>
             <a:r>
               <a:rPr lang="es-AR" sz="1200" dirty="0" smtClean="0">
@@ -26769,15 +26787,7 @@
                   <a:srgbClr val="000000"/>
                 </a:solidFill>
               </a:rPr>
-              <a:t> clave </a:t>
-            </a:r>
-            <a:r>
-              <a:rPr lang="es-AR" sz="1200" b="1" dirty="0" smtClean="0">
-                <a:solidFill>
-                  <a:srgbClr val="000000"/>
-                </a:solidFill>
-              </a:rPr>
-              <a:t>=</a:t>
+              <a:t> </a:t>
             </a:r>
             <a:r>
               <a:rPr lang="es-AR" sz="1200" dirty="0" smtClean="0">
@@ -26785,23 +26795,7 @@
                   <a:srgbClr val="000000"/>
                 </a:solidFill>
               </a:rPr>
-              <a:t> </a:t>
-            </a:r>
-            <a:r>
-              <a:rPr lang="es-AR" sz="1200" dirty="0" err="1" smtClean="0">
-                <a:solidFill>
-                  <a:srgbClr val="000000"/>
-                </a:solidFill>
-              </a:rPr>
-              <a:t>clavIngresada</a:t>
-            </a:r>
-            <a:r>
-              <a:rPr lang="es-AR" sz="1200" dirty="0" smtClean="0">
-                <a:solidFill>
-                  <a:srgbClr val="000000"/>
-                </a:solidFill>
-              </a:rPr>
-              <a:t> </a:t>
+              <a:t>claveIngresada </a:t>
             </a:r>
             <a:r>
               <a:rPr lang="es-AR" sz="1200" b="1" dirty="0" smtClean="0">
@@ -27161,21 +27155,21 @@
                 <a:gridCol w="3402028">
                   <a:extLst>
                     <a:ext uri="{9D8B030D-6E8A-4147-A177-3AD203B41FA5}">
-                      <a16:colId xmlns:a16="http://schemas.microsoft.com/office/drawing/2014/main" val="20000"/>
+                      <a16:colId xmlns:a16="http://schemas.microsoft.com/office/drawing/2014/main" xmlns="" val="20000"/>
                     </a:ext>
                   </a:extLst>
                 </a:gridCol>
                 <a:gridCol w="2409769">
                   <a:extLst>
                     <a:ext uri="{9D8B030D-6E8A-4147-A177-3AD203B41FA5}">
-                      <a16:colId xmlns:a16="http://schemas.microsoft.com/office/drawing/2014/main" val="20001"/>
+                      <a16:colId xmlns:a16="http://schemas.microsoft.com/office/drawing/2014/main" xmlns="" val="20001"/>
                     </a:ext>
                   </a:extLst>
                 </a:gridCol>
                 <a:gridCol w="2074376">
                   <a:extLst>
                     <a:ext uri="{9D8B030D-6E8A-4147-A177-3AD203B41FA5}">
-                      <a16:colId xmlns:a16="http://schemas.microsoft.com/office/drawing/2014/main" val="20002"/>
+                      <a16:colId xmlns:a16="http://schemas.microsoft.com/office/drawing/2014/main" xmlns="" val="20002"/>
                     </a:ext>
                   </a:extLst>
                 </a:gridCol>
@@ -27250,7 +27244,7 @@
                 </a:tc>
                 <a:extLst>
                   <a:ext uri="{0D108BD9-81ED-4DB2-BD59-A6C34878D82A}">
-                    <a16:rowId xmlns:a16="http://schemas.microsoft.com/office/drawing/2014/main" val="10000"/>
+                    <a16:rowId xmlns:a16="http://schemas.microsoft.com/office/drawing/2014/main" xmlns="" val="10000"/>
                   </a:ext>
                 </a:extLst>
               </a:tr>
@@ -28154,7 +28148,7 @@
                 </a:tc>
                 <a:extLst>
                   <a:ext uri="{0D108BD9-81ED-4DB2-BD59-A6C34878D82A}">
-                    <a16:rowId xmlns:a16="http://schemas.microsoft.com/office/drawing/2014/main" val="10001"/>
+                    <a16:rowId xmlns:a16="http://schemas.microsoft.com/office/drawing/2014/main" xmlns="" val="10001"/>
                   </a:ext>
                 </a:extLst>
               </a:tr>
@@ -28220,7 +28214,7 @@
                 </a:tc>
                 <a:extLst>
                   <a:ext uri="{0D108BD9-81ED-4DB2-BD59-A6C34878D82A}">
-                    <a16:rowId xmlns:a16="http://schemas.microsoft.com/office/drawing/2014/main" val="10002"/>
+                    <a16:rowId xmlns:a16="http://schemas.microsoft.com/office/drawing/2014/main" xmlns="" val="10002"/>
                   </a:ext>
                 </a:extLst>
               </a:tr>
@@ -28286,7 +28280,7 @@
                 </a:tc>
                 <a:extLst>
                   <a:ext uri="{0D108BD9-81ED-4DB2-BD59-A6C34878D82A}">
-                    <a16:rowId xmlns:a16="http://schemas.microsoft.com/office/drawing/2014/main" val="10003"/>
+                    <a16:rowId xmlns:a16="http://schemas.microsoft.com/office/drawing/2014/main" xmlns="" val="10003"/>
                   </a:ext>
                 </a:extLst>
               </a:tr>
@@ -29593,21 +29587,21 @@
                 <a:gridCol w="3762597">
                   <a:extLst>
                     <a:ext uri="{9D8B030D-6E8A-4147-A177-3AD203B41FA5}">
-                      <a16:colId xmlns:a16="http://schemas.microsoft.com/office/drawing/2014/main" val="20000"/>
+                      <a16:colId xmlns:a16="http://schemas.microsoft.com/office/drawing/2014/main" xmlns="" val="20000"/>
                     </a:ext>
                   </a:extLst>
                 </a:gridCol>
                 <a:gridCol w="2137144">
                   <a:extLst>
                     <a:ext uri="{9D8B030D-6E8A-4147-A177-3AD203B41FA5}">
-                      <a16:colId xmlns:a16="http://schemas.microsoft.com/office/drawing/2014/main" val="20001"/>
+                      <a16:colId xmlns:a16="http://schemas.microsoft.com/office/drawing/2014/main" xmlns="" val="20001"/>
                     </a:ext>
                   </a:extLst>
                 </a:gridCol>
                 <a:gridCol w="1986959">
                   <a:extLst>
                     <a:ext uri="{9D8B030D-6E8A-4147-A177-3AD203B41FA5}">
-                      <a16:colId xmlns:a16="http://schemas.microsoft.com/office/drawing/2014/main" val="20002"/>
+                      <a16:colId xmlns:a16="http://schemas.microsoft.com/office/drawing/2014/main" xmlns="" val="20002"/>
                     </a:ext>
                   </a:extLst>
                 </a:gridCol>
@@ -29660,7 +29654,7 @@
                 </a:tc>
                 <a:extLst>
                   <a:ext uri="{0D108BD9-81ED-4DB2-BD59-A6C34878D82A}">
-                    <a16:rowId xmlns:a16="http://schemas.microsoft.com/office/drawing/2014/main" val="10000"/>
+                    <a16:rowId xmlns:a16="http://schemas.microsoft.com/office/drawing/2014/main" xmlns="" val="10000"/>
                   </a:ext>
                 </a:extLst>
               </a:tr>
@@ -30374,7 +30368,7 @@
                 </a:tc>
                 <a:extLst>
                   <a:ext uri="{0D108BD9-81ED-4DB2-BD59-A6C34878D82A}">
-                    <a16:rowId xmlns:a16="http://schemas.microsoft.com/office/drawing/2014/main" val="10001"/>
+                    <a16:rowId xmlns:a16="http://schemas.microsoft.com/office/drawing/2014/main" xmlns="" val="10001"/>
                   </a:ext>
                 </a:extLst>
               </a:tr>
@@ -30439,7 +30433,7 @@
                 </a:tc>
                 <a:extLst>
                   <a:ext uri="{0D108BD9-81ED-4DB2-BD59-A6C34878D82A}">
-                    <a16:rowId xmlns:a16="http://schemas.microsoft.com/office/drawing/2014/main" val="10002"/>
+                    <a16:rowId xmlns:a16="http://schemas.microsoft.com/office/drawing/2014/main" xmlns="" val="10002"/>
                   </a:ext>
                 </a:extLst>
               </a:tr>
@@ -30504,7 +30498,7 @@
                 </a:tc>
                 <a:extLst>
                   <a:ext uri="{0D108BD9-81ED-4DB2-BD59-A6C34878D82A}">
-                    <a16:rowId xmlns:a16="http://schemas.microsoft.com/office/drawing/2014/main" val="10003"/>
+                    <a16:rowId xmlns:a16="http://schemas.microsoft.com/office/drawing/2014/main" xmlns="" val="10003"/>
                   </a:ext>
                 </a:extLst>
               </a:tr>
@@ -30569,7 +30563,7 @@
                 </a:tc>
                 <a:extLst>
                   <a:ext uri="{0D108BD9-81ED-4DB2-BD59-A6C34878D82A}">
-                    <a16:rowId xmlns:a16="http://schemas.microsoft.com/office/drawing/2014/main" val="10004"/>
+                    <a16:rowId xmlns:a16="http://schemas.microsoft.com/office/drawing/2014/main" xmlns="" val="10004"/>
                   </a:ext>
                 </a:extLst>
               </a:tr>
@@ -30606,7 +30600,7 @@
                 </a:tc>
                 <a:extLst>
                   <a:ext uri="{0D108BD9-81ED-4DB2-BD59-A6C34878D82A}">
-                    <a16:rowId xmlns:a16="http://schemas.microsoft.com/office/drawing/2014/main" val="10005"/>
+                    <a16:rowId xmlns:a16="http://schemas.microsoft.com/office/drawing/2014/main" xmlns="" val="10005"/>
                   </a:ext>
                 </a:extLst>
               </a:tr>
@@ -35158,21 +35152,21 @@
                 <a:gridCol w="3826392">
                   <a:extLst>
                     <a:ext uri="{9D8B030D-6E8A-4147-A177-3AD203B41FA5}">
-                      <a16:colId xmlns:a16="http://schemas.microsoft.com/office/drawing/2014/main" val="20000"/>
+                      <a16:colId xmlns:a16="http://schemas.microsoft.com/office/drawing/2014/main" xmlns="" val="20000"/>
                     </a:ext>
                   </a:extLst>
                 </a:gridCol>
                 <a:gridCol w="2041451">
                   <a:extLst>
                     <a:ext uri="{9D8B030D-6E8A-4147-A177-3AD203B41FA5}">
-                      <a16:colId xmlns:a16="http://schemas.microsoft.com/office/drawing/2014/main" val="20001"/>
+                      <a16:colId xmlns:a16="http://schemas.microsoft.com/office/drawing/2014/main" xmlns="" val="20001"/>
                     </a:ext>
                   </a:extLst>
                 </a:gridCol>
                 <a:gridCol w="2018857">
                   <a:extLst>
                     <a:ext uri="{9D8B030D-6E8A-4147-A177-3AD203B41FA5}">
-                      <a16:colId xmlns:a16="http://schemas.microsoft.com/office/drawing/2014/main" val="20002"/>
+                      <a16:colId xmlns:a16="http://schemas.microsoft.com/office/drawing/2014/main" xmlns="" val="20002"/>
                     </a:ext>
                   </a:extLst>
                 </a:gridCol>
@@ -35225,7 +35219,7 @@
                 </a:tc>
                 <a:extLst>
                   <a:ext uri="{0D108BD9-81ED-4DB2-BD59-A6C34878D82A}">
-                    <a16:rowId xmlns:a16="http://schemas.microsoft.com/office/drawing/2014/main" val="10000"/>
+                    <a16:rowId xmlns:a16="http://schemas.microsoft.com/office/drawing/2014/main" xmlns="" val="10000"/>
                   </a:ext>
                 </a:extLst>
               </a:tr>
@@ -35847,7 +35841,7 @@
                 </a:tc>
                 <a:extLst>
                   <a:ext uri="{0D108BD9-81ED-4DB2-BD59-A6C34878D82A}">
-                    <a16:rowId xmlns:a16="http://schemas.microsoft.com/office/drawing/2014/main" val="10001"/>
+                    <a16:rowId xmlns:a16="http://schemas.microsoft.com/office/drawing/2014/main" xmlns="" val="10001"/>
                   </a:ext>
                 </a:extLst>
               </a:tr>
@@ -35912,7 +35906,7 @@
                 </a:tc>
                 <a:extLst>
                   <a:ext uri="{0D108BD9-81ED-4DB2-BD59-A6C34878D82A}">
-                    <a16:rowId xmlns:a16="http://schemas.microsoft.com/office/drawing/2014/main" val="10002"/>
+                    <a16:rowId xmlns:a16="http://schemas.microsoft.com/office/drawing/2014/main" xmlns="" val="10002"/>
                   </a:ext>
                 </a:extLst>
               </a:tr>
@@ -35977,7 +35971,7 @@
                 </a:tc>
                 <a:extLst>
                   <a:ext uri="{0D108BD9-81ED-4DB2-BD59-A6C34878D82A}">
-                    <a16:rowId xmlns:a16="http://schemas.microsoft.com/office/drawing/2014/main" val="10003"/>
+                    <a16:rowId xmlns:a16="http://schemas.microsoft.com/office/drawing/2014/main" xmlns="" val="10003"/>
                   </a:ext>
                 </a:extLst>
               </a:tr>
@@ -36042,7 +36036,7 @@
                 </a:tc>
                 <a:extLst>
                   <a:ext uri="{0D108BD9-81ED-4DB2-BD59-A6C34878D82A}">
-                    <a16:rowId xmlns:a16="http://schemas.microsoft.com/office/drawing/2014/main" val="10004"/>
+                    <a16:rowId xmlns:a16="http://schemas.microsoft.com/office/drawing/2014/main" xmlns="" val="10004"/>
                   </a:ext>
                 </a:extLst>
               </a:tr>
@@ -36079,7 +36073,7 @@
                 </a:tc>
                 <a:extLst>
                   <a:ext uri="{0D108BD9-81ED-4DB2-BD59-A6C34878D82A}">
-                    <a16:rowId xmlns:a16="http://schemas.microsoft.com/office/drawing/2014/main" val="10005"/>
+                    <a16:rowId xmlns:a16="http://schemas.microsoft.com/office/drawing/2014/main" xmlns="" val="10005"/>
                   </a:ext>
                 </a:extLst>
               </a:tr>
@@ -38513,15 +38507,31 @@
                   <a:srgbClr val="FF0000"/>
                 </a:solidFill>
               </a:rPr>
-              <a:t>"Es"</a:t>
+              <a:t>"</a:t>
             </a:r>
             <a:r>
               <a:rPr lang="es-AR" sz="2400" dirty="0" smtClean="0">
                 <a:solidFill>
-                  <a:srgbClr val="000000"/>
-                </a:solidFill>
-              </a:rPr>
-              <a:t> e </a:t>
+                  <a:srgbClr val="FF0000"/>
+                </a:solidFill>
+              </a:rPr>
+              <a:t>Es”,</a:t>
+            </a:r>
+            <a:r>
+              <a:rPr lang="es-AR" sz="2400" dirty="0" smtClean="0">
+                <a:solidFill>
+                  <a:srgbClr val="000000"/>
+                </a:solidFill>
+              </a:rPr>
+              <a:t> </a:t>
+            </a:r>
+            <a:r>
+              <a:rPr lang="es-AR" sz="2400" dirty="0" smtClean="0">
+                <a:solidFill>
+                  <a:srgbClr val="000000"/>
+                </a:solidFill>
+              </a:rPr>
+              <a:t>e </a:t>
             </a:r>
           </a:p>
           <a:p>
@@ -38571,15 +38581,31 @@
                   <a:srgbClr val="FF0000"/>
                 </a:solidFill>
               </a:rPr>
-              <a:t>"No es"</a:t>
+              <a:t>"No </a:t>
             </a:r>
             <a:r>
               <a:rPr lang="es-AR" sz="2400" dirty="0" smtClean="0">
                 <a:solidFill>
-                  <a:srgbClr val="000000"/>
-                </a:solidFill>
-              </a:rPr>
-              <a:t> e </a:t>
+                  <a:srgbClr val="FF0000"/>
+                </a:solidFill>
+              </a:rPr>
+              <a:t>es”,</a:t>
+            </a:r>
+            <a:r>
+              <a:rPr lang="es-AR" sz="2400" dirty="0" smtClean="0">
+                <a:solidFill>
+                  <a:srgbClr val="000000"/>
+                </a:solidFill>
+              </a:rPr>
+              <a:t> </a:t>
+            </a:r>
+            <a:r>
+              <a:rPr lang="es-AR" sz="2400" dirty="0" smtClean="0">
+                <a:solidFill>
+                  <a:srgbClr val="000000"/>
+                </a:solidFill>
+              </a:rPr>
+              <a:t>e </a:t>
             </a:r>
           </a:p>
           <a:p>
@@ -38974,15 +39000,31 @@
                   <a:srgbClr val="FF0000"/>
                 </a:solidFill>
               </a:rPr>
-              <a:t>"Es"</a:t>
+              <a:t>"</a:t>
             </a:r>
             <a:r>
               <a:rPr lang="es-AR" sz="2400" dirty="0" smtClean="0">
                 <a:solidFill>
-                  <a:srgbClr val="000000"/>
-                </a:solidFill>
-              </a:rPr>
-              <a:t> e </a:t>
+                  <a:srgbClr val="FF0000"/>
+                </a:solidFill>
+              </a:rPr>
+              <a:t>Es”,</a:t>
+            </a:r>
+            <a:r>
+              <a:rPr lang="es-AR" sz="2400" dirty="0" smtClean="0">
+                <a:solidFill>
+                  <a:srgbClr val="000000"/>
+                </a:solidFill>
+              </a:rPr>
+              <a:t> </a:t>
+            </a:r>
+            <a:r>
+              <a:rPr lang="es-AR" sz="2400" dirty="0" smtClean="0">
+                <a:solidFill>
+                  <a:srgbClr val="000000"/>
+                </a:solidFill>
+              </a:rPr>
+              <a:t>e </a:t>
             </a:r>
           </a:p>
           <a:p>
@@ -39032,15 +39074,31 @@
                   <a:srgbClr val="FF0000"/>
                 </a:solidFill>
               </a:rPr>
-              <a:t>"No es"</a:t>
+              <a:t>"No </a:t>
             </a:r>
             <a:r>
               <a:rPr lang="es-AR" sz="2400" dirty="0" smtClean="0">
                 <a:solidFill>
-                  <a:srgbClr val="000000"/>
-                </a:solidFill>
-              </a:rPr>
-              <a:t> e </a:t>
+                  <a:srgbClr val="FF0000"/>
+                </a:solidFill>
+              </a:rPr>
+              <a:t>es”,</a:t>
+            </a:r>
+            <a:r>
+              <a:rPr lang="es-AR" sz="2400" dirty="0" smtClean="0">
+                <a:solidFill>
+                  <a:srgbClr val="000000"/>
+                </a:solidFill>
+              </a:rPr>
+              <a:t> </a:t>
+            </a:r>
+            <a:r>
+              <a:rPr lang="es-AR" sz="2400" dirty="0" smtClean="0">
+                <a:solidFill>
+                  <a:srgbClr val="000000"/>
+                </a:solidFill>
+              </a:rPr>
+              <a:t>e </a:t>
             </a:r>
           </a:p>
           <a:p>
@@ -40558,14 +40616,14 @@
                 <a:gridCol w="3048000">
                   <a:extLst>
                     <a:ext uri="{9D8B030D-6E8A-4147-A177-3AD203B41FA5}">
-                      <a16:colId xmlns:a16="http://schemas.microsoft.com/office/drawing/2014/main" val="20000"/>
+                      <a16:colId xmlns:a16="http://schemas.microsoft.com/office/drawing/2014/main" xmlns="" val="20000"/>
                     </a:ext>
                   </a:extLst>
                 </a:gridCol>
                 <a:gridCol w="3048000">
                   <a:extLst>
                     <a:ext uri="{9D8B030D-6E8A-4147-A177-3AD203B41FA5}">
-                      <a16:colId xmlns:a16="http://schemas.microsoft.com/office/drawing/2014/main" val="20001"/>
+                      <a16:colId xmlns:a16="http://schemas.microsoft.com/office/drawing/2014/main" xmlns="" val="20001"/>
                     </a:ext>
                   </a:extLst>
                 </a:gridCol>
@@ -40604,7 +40662,7 @@
                 </a:tc>
                 <a:extLst>
                   <a:ext uri="{0D108BD9-81ED-4DB2-BD59-A6C34878D82A}">
-                    <a16:rowId xmlns:a16="http://schemas.microsoft.com/office/drawing/2014/main" val="10000"/>
+                    <a16:rowId xmlns:a16="http://schemas.microsoft.com/office/drawing/2014/main" xmlns="" val="10000"/>
                   </a:ext>
                 </a:extLst>
               </a:tr>
@@ -40655,7 +40713,7 @@
                 </a:tc>
                 <a:extLst>
                   <a:ext uri="{0D108BD9-81ED-4DB2-BD59-A6C34878D82A}">
-                    <a16:rowId xmlns:a16="http://schemas.microsoft.com/office/drawing/2014/main" val="10001"/>
+                    <a16:rowId xmlns:a16="http://schemas.microsoft.com/office/drawing/2014/main" xmlns="" val="10001"/>
                   </a:ext>
                 </a:extLst>
               </a:tr>
@@ -40690,7 +40748,7 @@
                 </a:tc>
                 <a:extLst>
                   <a:ext uri="{0D108BD9-81ED-4DB2-BD59-A6C34878D82A}">
-                    <a16:rowId xmlns:a16="http://schemas.microsoft.com/office/drawing/2014/main" val="10002"/>
+                    <a16:rowId xmlns:a16="http://schemas.microsoft.com/office/drawing/2014/main" xmlns="" val="10002"/>
                   </a:ext>
                 </a:extLst>
               </a:tr>
@@ -40725,7 +40783,7 @@
                 </a:tc>
                 <a:extLst>
                   <a:ext uri="{0D108BD9-81ED-4DB2-BD59-A6C34878D82A}">
-                    <a16:rowId xmlns:a16="http://schemas.microsoft.com/office/drawing/2014/main" val="10003"/>
+                    <a16:rowId xmlns:a16="http://schemas.microsoft.com/office/drawing/2014/main" xmlns="" val="10003"/>
                   </a:ext>
                 </a:extLst>
               </a:tr>
@@ -40760,7 +40818,7 @@
                 </a:tc>
                 <a:extLst>
                   <a:ext uri="{0D108BD9-81ED-4DB2-BD59-A6C34878D82A}">
-                    <a16:rowId xmlns:a16="http://schemas.microsoft.com/office/drawing/2014/main" val="10004"/>
+                    <a16:rowId xmlns:a16="http://schemas.microsoft.com/office/drawing/2014/main" xmlns="" val="10004"/>
                   </a:ext>
                 </a:extLst>
               </a:tr>
@@ -42125,21 +42183,21 @@
                 <a:gridCol w="4954772">
                   <a:extLst>
                     <a:ext uri="{9D8B030D-6E8A-4147-A177-3AD203B41FA5}">
-                      <a16:colId xmlns:a16="http://schemas.microsoft.com/office/drawing/2014/main" val="20000"/>
+                      <a16:colId xmlns:a16="http://schemas.microsoft.com/office/drawing/2014/main" xmlns="" val="20000"/>
                     </a:ext>
                   </a:extLst>
                 </a:gridCol>
                 <a:gridCol w="1719378">
                   <a:extLst>
                     <a:ext uri="{9D8B030D-6E8A-4147-A177-3AD203B41FA5}">
-                      <a16:colId xmlns:a16="http://schemas.microsoft.com/office/drawing/2014/main" val="20001"/>
+                      <a16:colId xmlns:a16="http://schemas.microsoft.com/office/drawing/2014/main" xmlns="" val="20001"/>
                     </a:ext>
                   </a:extLst>
                 </a:gridCol>
                 <a:gridCol w="1564753">
                   <a:extLst>
                     <a:ext uri="{9D8B030D-6E8A-4147-A177-3AD203B41FA5}">
-                      <a16:colId xmlns:a16="http://schemas.microsoft.com/office/drawing/2014/main" val="20002"/>
+                      <a16:colId xmlns:a16="http://schemas.microsoft.com/office/drawing/2014/main" xmlns="" val="20002"/>
                     </a:ext>
                   </a:extLst>
                 </a:gridCol>
@@ -42196,7 +42254,7 @@
                 </a:tc>
                 <a:extLst>
                   <a:ext uri="{0D108BD9-81ED-4DB2-BD59-A6C34878D82A}">
-                    <a16:rowId xmlns:a16="http://schemas.microsoft.com/office/drawing/2014/main" val="10000"/>
+                    <a16:rowId xmlns:a16="http://schemas.microsoft.com/office/drawing/2014/main" xmlns="" val="10000"/>
                   </a:ext>
                 </a:extLst>
               </a:tr>
@@ -43064,7 +43122,7 @@
                 </a:tc>
                 <a:extLst>
                   <a:ext uri="{0D108BD9-81ED-4DB2-BD59-A6C34878D82A}">
-                    <a16:rowId xmlns:a16="http://schemas.microsoft.com/office/drawing/2014/main" val="10001"/>
+                    <a16:rowId xmlns:a16="http://schemas.microsoft.com/office/drawing/2014/main" xmlns="" val="10001"/>
                   </a:ext>
                 </a:extLst>
               </a:tr>
@@ -43145,7 +43203,7 @@
                 </a:tc>
                 <a:extLst>
                   <a:ext uri="{0D108BD9-81ED-4DB2-BD59-A6C34878D82A}">
-                    <a16:rowId xmlns:a16="http://schemas.microsoft.com/office/drawing/2014/main" val="10002"/>
+                    <a16:rowId xmlns:a16="http://schemas.microsoft.com/office/drawing/2014/main" xmlns="" val="10002"/>
                   </a:ext>
                 </a:extLst>
               </a:tr>
@@ -43231,7 +43289,7 @@
                 </a:tc>
                 <a:extLst>
                   <a:ext uri="{0D108BD9-81ED-4DB2-BD59-A6C34878D82A}">
-                    <a16:rowId xmlns:a16="http://schemas.microsoft.com/office/drawing/2014/main" val="10003"/>
+                    <a16:rowId xmlns:a16="http://schemas.microsoft.com/office/drawing/2014/main" xmlns="" val="10003"/>
                   </a:ext>
                 </a:extLst>
               </a:tr>
@@ -43312,7 +43370,7 @@
                 </a:tc>
                 <a:extLst>
                   <a:ext uri="{0D108BD9-81ED-4DB2-BD59-A6C34878D82A}">
-                    <a16:rowId xmlns:a16="http://schemas.microsoft.com/office/drawing/2014/main" val="10004"/>
+                    <a16:rowId xmlns:a16="http://schemas.microsoft.com/office/drawing/2014/main" xmlns="" val="10004"/>
                   </a:ext>
                 </a:extLst>
               </a:tr>
@@ -44535,21 +44593,21 @@
                 <a:gridCol w="4005836">
                   <a:extLst>
                     <a:ext uri="{9D8B030D-6E8A-4147-A177-3AD203B41FA5}">
-                      <a16:colId xmlns:a16="http://schemas.microsoft.com/office/drawing/2014/main" val="20000"/>
+                      <a16:colId xmlns:a16="http://schemas.microsoft.com/office/drawing/2014/main" xmlns="" val="20000"/>
                     </a:ext>
                   </a:extLst>
                 </a:gridCol>
                 <a:gridCol w="1529297">
                   <a:extLst>
                     <a:ext uri="{9D8B030D-6E8A-4147-A177-3AD203B41FA5}">
-                      <a16:colId xmlns:a16="http://schemas.microsoft.com/office/drawing/2014/main" val="20001"/>
+                      <a16:colId xmlns:a16="http://schemas.microsoft.com/office/drawing/2014/main" xmlns="" val="20001"/>
                     </a:ext>
                   </a:extLst>
                 </a:gridCol>
                 <a:gridCol w="2767566">
                   <a:extLst>
                     <a:ext uri="{9D8B030D-6E8A-4147-A177-3AD203B41FA5}">
-                      <a16:colId xmlns:a16="http://schemas.microsoft.com/office/drawing/2014/main" val="20002"/>
+                      <a16:colId xmlns:a16="http://schemas.microsoft.com/office/drawing/2014/main" xmlns="" val="20002"/>
                     </a:ext>
                   </a:extLst>
                 </a:gridCol>
@@ -44602,7 +44660,7 @@
                 </a:tc>
                 <a:extLst>
                   <a:ext uri="{0D108BD9-81ED-4DB2-BD59-A6C34878D82A}">
-                    <a16:rowId xmlns:a16="http://schemas.microsoft.com/office/drawing/2014/main" val="10000"/>
+                    <a16:rowId xmlns:a16="http://schemas.microsoft.com/office/drawing/2014/main" xmlns="" val="10000"/>
                   </a:ext>
                 </a:extLst>
               </a:tr>
@@ -45359,7 +45417,7 @@
                 </a:tc>
                 <a:extLst>
                   <a:ext uri="{0D108BD9-81ED-4DB2-BD59-A6C34878D82A}">
-                    <a16:rowId xmlns:a16="http://schemas.microsoft.com/office/drawing/2014/main" val="10001"/>
+                    <a16:rowId xmlns:a16="http://schemas.microsoft.com/office/drawing/2014/main" xmlns="" val="10001"/>
                   </a:ext>
                 </a:extLst>
               </a:tr>
@@ -45439,7 +45497,7 @@
                 </a:tc>
                 <a:extLst>
                   <a:ext uri="{0D108BD9-81ED-4DB2-BD59-A6C34878D82A}">
-                    <a16:rowId xmlns:a16="http://schemas.microsoft.com/office/drawing/2014/main" val="10002"/>
+                    <a16:rowId xmlns:a16="http://schemas.microsoft.com/office/drawing/2014/main" xmlns="" val="10002"/>
                   </a:ext>
                 </a:extLst>
               </a:tr>
@@ -45519,7 +45577,7 @@
                 </a:tc>
                 <a:extLst>
                   <a:ext uri="{0D108BD9-81ED-4DB2-BD59-A6C34878D82A}">
-                    <a16:rowId xmlns:a16="http://schemas.microsoft.com/office/drawing/2014/main" val="10003"/>
+                    <a16:rowId xmlns:a16="http://schemas.microsoft.com/office/drawing/2014/main" xmlns="" val="10003"/>
                   </a:ext>
                 </a:extLst>
               </a:tr>
@@ -45900,21 +45958,21 @@
                 <a:gridCol w="1850955">
                   <a:extLst>
                     <a:ext uri="{9D8B030D-6E8A-4147-A177-3AD203B41FA5}">
-                      <a16:colId xmlns:a16="http://schemas.microsoft.com/office/drawing/2014/main" val="20000"/>
+                      <a16:colId xmlns:a16="http://schemas.microsoft.com/office/drawing/2014/main" xmlns="" val="20000"/>
                     </a:ext>
                   </a:extLst>
                 </a:gridCol>
                 <a:gridCol w="2206999">
                   <a:extLst>
                     <a:ext uri="{9D8B030D-6E8A-4147-A177-3AD203B41FA5}">
-                      <a16:colId xmlns:a16="http://schemas.microsoft.com/office/drawing/2014/main" val="20001"/>
+                      <a16:colId xmlns:a16="http://schemas.microsoft.com/office/drawing/2014/main" xmlns="" val="20001"/>
                     </a:ext>
                   </a:extLst>
                 </a:gridCol>
                 <a:gridCol w="4794953">
                   <a:extLst>
                     <a:ext uri="{9D8B030D-6E8A-4147-A177-3AD203B41FA5}">
-                      <a16:colId xmlns:a16="http://schemas.microsoft.com/office/drawing/2014/main" val="20002"/>
+                      <a16:colId xmlns:a16="http://schemas.microsoft.com/office/drawing/2014/main" xmlns="" val="20002"/>
                     </a:ext>
                   </a:extLst>
                 </a:gridCol>
@@ -46126,7 +46184,7 @@
                 </a:tc>
                 <a:extLst>
                   <a:ext uri="{0D108BD9-81ED-4DB2-BD59-A6C34878D82A}">
-                    <a16:rowId xmlns:a16="http://schemas.microsoft.com/office/drawing/2014/main" val="10000"/>
+                    <a16:rowId xmlns:a16="http://schemas.microsoft.com/office/drawing/2014/main" xmlns="" val="10000"/>
                   </a:ext>
                 </a:extLst>
               </a:tr>
@@ -46280,7 +46338,7 @@
                 </a:tc>
                 <a:extLst>
                   <a:ext uri="{0D108BD9-81ED-4DB2-BD59-A6C34878D82A}">
-                    <a16:rowId xmlns:a16="http://schemas.microsoft.com/office/drawing/2014/main" val="10001"/>
+                    <a16:rowId xmlns:a16="http://schemas.microsoft.com/office/drawing/2014/main" xmlns="" val="10001"/>
                   </a:ext>
                 </a:extLst>
               </a:tr>
@@ -46438,7 +46496,7 @@
                 </a:tc>
                 <a:extLst>
                   <a:ext uri="{0D108BD9-81ED-4DB2-BD59-A6C34878D82A}">
-                    <a16:rowId xmlns:a16="http://schemas.microsoft.com/office/drawing/2014/main" val="10002"/>
+                    <a16:rowId xmlns:a16="http://schemas.microsoft.com/office/drawing/2014/main" xmlns="" val="10002"/>
                   </a:ext>
                 </a:extLst>
               </a:tr>
@@ -46614,7 +46672,7 @@
                 </a:tc>
                 <a:extLst>
                   <a:ext uri="{0D108BD9-81ED-4DB2-BD59-A6C34878D82A}">
-                    <a16:rowId xmlns:a16="http://schemas.microsoft.com/office/drawing/2014/main" val="10003"/>
+                    <a16:rowId xmlns:a16="http://schemas.microsoft.com/office/drawing/2014/main" xmlns="" val="10003"/>
                   </a:ext>
                 </a:extLst>
               </a:tr>
@@ -46778,7 +46836,7 @@
                 </a:tc>
                 <a:extLst>
                   <a:ext uri="{0D108BD9-81ED-4DB2-BD59-A6C34878D82A}">
-                    <a16:rowId xmlns:a16="http://schemas.microsoft.com/office/drawing/2014/main" val="10004"/>
+                    <a16:rowId xmlns:a16="http://schemas.microsoft.com/office/drawing/2014/main" xmlns="" val="10004"/>
                   </a:ext>
                 </a:extLst>
               </a:tr>
@@ -46966,7 +47024,7 @@
                 </a:tc>
                 <a:extLst>
                   <a:ext uri="{0D108BD9-81ED-4DB2-BD59-A6C34878D82A}">
-                    <a16:rowId xmlns:a16="http://schemas.microsoft.com/office/drawing/2014/main" val="10005"/>
+                    <a16:rowId xmlns:a16="http://schemas.microsoft.com/office/drawing/2014/main" xmlns="" val="10005"/>
                   </a:ext>
                 </a:extLst>
               </a:tr>
@@ -47154,7 +47212,7 @@
                 </a:tc>
                 <a:extLst>
                   <a:ext uri="{0D108BD9-81ED-4DB2-BD59-A6C34878D82A}">
-                    <a16:rowId xmlns:a16="http://schemas.microsoft.com/office/drawing/2014/main" val="10006"/>
+                    <a16:rowId xmlns:a16="http://schemas.microsoft.com/office/drawing/2014/main" xmlns="" val="10006"/>
                   </a:ext>
                 </a:extLst>
               </a:tr>
@@ -47346,7 +47404,7 @@
                 </a:tc>
                 <a:extLst>
                   <a:ext uri="{0D108BD9-81ED-4DB2-BD59-A6C34878D82A}">
-                    <a16:rowId xmlns:a16="http://schemas.microsoft.com/office/drawing/2014/main" val="10007"/>
+                    <a16:rowId xmlns:a16="http://schemas.microsoft.com/office/drawing/2014/main" xmlns="" val="10007"/>
                   </a:ext>
                 </a:extLst>
               </a:tr>
@@ -48663,21 +48721,21 @@
                 <a:gridCol w="4646428">
                   <a:extLst>
                     <a:ext uri="{9D8B030D-6E8A-4147-A177-3AD203B41FA5}">
-                      <a16:colId xmlns:a16="http://schemas.microsoft.com/office/drawing/2014/main" val="20000"/>
+                      <a16:colId xmlns:a16="http://schemas.microsoft.com/office/drawing/2014/main" xmlns="" val="20000"/>
                     </a:ext>
                   </a:extLst>
                 </a:gridCol>
                 <a:gridCol w="1468136">
                   <a:extLst>
                     <a:ext uri="{9D8B030D-6E8A-4147-A177-3AD203B41FA5}">
-                      <a16:colId xmlns:a16="http://schemas.microsoft.com/office/drawing/2014/main" val="20001"/>
+                      <a16:colId xmlns:a16="http://schemas.microsoft.com/office/drawing/2014/main" xmlns="" val="20001"/>
                     </a:ext>
                   </a:extLst>
                 </a:gridCol>
                 <a:gridCol w="2400786">
                   <a:extLst>
                     <a:ext uri="{9D8B030D-6E8A-4147-A177-3AD203B41FA5}">
-                      <a16:colId xmlns:a16="http://schemas.microsoft.com/office/drawing/2014/main" val="20002"/>
+                      <a16:colId xmlns:a16="http://schemas.microsoft.com/office/drawing/2014/main" xmlns="" val="20002"/>
                     </a:ext>
                   </a:extLst>
                 </a:gridCol>
@@ -48730,7 +48788,7 @@
                 </a:tc>
                 <a:extLst>
                   <a:ext uri="{0D108BD9-81ED-4DB2-BD59-A6C34878D82A}">
-                    <a16:rowId xmlns:a16="http://schemas.microsoft.com/office/drawing/2014/main" val="10000"/>
+                    <a16:rowId xmlns:a16="http://schemas.microsoft.com/office/drawing/2014/main" xmlns="" val="10000"/>
                   </a:ext>
                 </a:extLst>
               </a:tr>
@@ -49843,7 +49901,7 @@
                 </a:tc>
                 <a:extLst>
                   <a:ext uri="{0D108BD9-81ED-4DB2-BD59-A6C34878D82A}">
-                    <a16:rowId xmlns:a16="http://schemas.microsoft.com/office/drawing/2014/main" val="10001"/>
+                    <a16:rowId xmlns:a16="http://schemas.microsoft.com/office/drawing/2014/main" xmlns="" val="10001"/>
                   </a:ext>
                 </a:extLst>
               </a:tr>
@@ -49941,7 +49999,7 @@
                 </a:tc>
                 <a:extLst>
                   <a:ext uri="{0D108BD9-81ED-4DB2-BD59-A6C34878D82A}">
-                    <a16:rowId xmlns:a16="http://schemas.microsoft.com/office/drawing/2014/main" val="10002"/>
+                    <a16:rowId xmlns:a16="http://schemas.microsoft.com/office/drawing/2014/main" xmlns="" val="10002"/>
                   </a:ext>
                 </a:extLst>
               </a:tr>
@@ -50009,7 +50067,7 @@
                 </a:tc>
                 <a:extLst>
                   <a:ext uri="{0D108BD9-81ED-4DB2-BD59-A6C34878D82A}">
-                    <a16:rowId xmlns:a16="http://schemas.microsoft.com/office/drawing/2014/main" val="10003"/>
+                    <a16:rowId xmlns:a16="http://schemas.microsoft.com/office/drawing/2014/main" xmlns="" val="10003"/>
                   </a:ext>
                 </a:extLst>
               </a:tr>
@@ -50284,14 +50342,14 @@
                 <a:gridCol w="3048000">
                   <a:extLst>
                     <a:ext uri="{9D8B030D-6E8A-4147-A177-3AD203B41FA5}">
-                      <a16:colId xmlns:a16="http://schemas.microsoft.com/office/drawing/2014/main" val="20000"/>
+                      <a16:colId xmlns:a16="http://schemas.microsoft.com/office/drawing/2014/main" xmlns="" val="20000"/>
                     </a:ext>
                   </a:extLst>
                 </a:gridCol>
                 <a:gridCol w="3048000">
                   <a:extLst>
                     <a:ext uri="{9D8B030D-6E8A-4147-A177-3AD203B41FA5}">
-                      <a16:colId xmlns:a16="http://schemas.microsoft.com/office/drawing/2014/main" val="20001"/>
+                      <a16:colId xmlns:a16="http://schemas.microsoft.com/office/drawing/2014/main" xmlns="" val="20001"/>
                     </a:ext>
                   </a:extLst>
                 </a:gridCol>
@@ -50330,7 +50388,7 @@
                 </a:tc>
                 <a:extLst>
                   <a:ext uri="{0D108BD9-81ED-4DB2-BD59-A6C34878D82A}">
-                    <a16:rowId xmlns:a16="http://schemas.microsoft.com/office/drawing/2014/main" val="10000"/>
+                    <a16:rowId xmlns:a16="http://schemas.microsoft.com/office/drawing/2014/main" xmlns="" val="10000"/>
                   </a:ext>
                 </a:extLst>
               </a:tr>
@@ -50381,7 +50439,7 @@
                 </a:tc>
                 <a:extLst>
                   <a:ext uri="{0D108BD9-81ED-4DB2-BD59-A6C34878D82A}">
-                    <a16:rowId xmlns:a16="http://schemas.microsoft.com/office/drawing/2014/main" val="10001"/>
+                    <a16:rowId xmlns:a16="http://schemas.microsoft.com/office/drawing/2014/main" xmlns="" val="10001"/>
                   </a:ext>
                 </a:extLst>
               </a:tr>
@@ -50416,7 +50474,7 @@
                 </a:tc>
                 <a:extLst>
                   <a:ext uri="{0D108BD9-81ED-4DB2-BD59-A6C34878D82A}">
-                    <a16:rowId xmlns:a16="http://schemas.microsoft.com/office/drawing/2014/main" val="10002"/>
+                    <a16:rowId xmlns:a16="http://schemas.microsoft.com/office/drawing/2014/main" xmlns="" val="10002"/>
                   </a:ext>
                 </a:extLst>
               </a:tr>
@@ -50451,7 +50509,7 @@
                 </a:tc>
                 <a:extLst>
                   <a:ext uri="{0D108BD9-81ED-4DB2-BD59-A6C34878D82A}">
-                    <a16:rowId xmlns:a16="http://schemas.microsoft.com/office/drawing/2014/main" val="10003"/>
+                    <a16:rowId xmlns:a16="http://schemas.microsoft.com/office/drawing/2014/main" xmlns="" val="10003"/>
                   </a:ext>
                 </a:extLst>
               </a:tr>
@@ -50486,7 +50544,7 @@
                 </a:tc>
                 <a:extLst>
                   <a:ext uri="{0D108BD9-81ED-4DB2-BD59-A6C34878D82A}">
-                    <a16:rowId xmlns:a16="http://schemas.microsoft.com/office/drawing/2014/main" val="10004"/>
+                    <a16:rowId xmlns:a16="http://schemas.microsoft.com/office/drawing/2014/main" xmlns="" val="10004"/>
                   </a:ext>
                 </a:extLst>
               </a:tr>
@@ -52145,21 +52203,21 @@
                 <a:gridCol w="4401093">
                   <a:extLst>
                     <a:ext uri="{9D8B030D-6E8A-4147-A177-3AD203B41FA5}">
-                      <a16:colId xmlns:a16="http://schemas.microsoft.com/office/drawing/2014/main" val="20000"/>
+                      <a16:colId xmlns:a16="http://schemas.microsoft.com/office/drawing/2014/main" xmlns="" val="20000"/>
                     </a:ext>
                   </a:extLst>
                 </a:gridCol>
                 <a:gridCol w="2054593">
                   <a:extLst>
                     <a:ext uri="{9D8B030D-6E8A-4147-A177-3AD203B41FA5}">
-                      <a16:colId xmlns:a16="http://schemas.microsoft.com/office/drawing/2014/main" val="20001"/>
+                      <a16:colId xmlns:a16="http://schemas.microsoft.com/office/drawing/2014/main" xmlns="" val="20001"/>
                     </a:ext>
                   </a:extLst>
                 </a:gridCol>
                 <a:gridCol w="2401234">
                   <a:extLst>
                     <a:ext uri="{9D8B030D-6E8A-4147-A177-3AD203B41FA5}">
-                      <a16:colId xmlns:a16="http://schemas.microsoft.com/office/drawing/2014/main" val="20002"/>
+                      <a16:colId xmlns:a16="http://schemas.microsoft.com/office/drawing/2014/main" xmlns="" val="20002"/>
                     </a:ext>
                   </a:extLst>
                 </a:gridCol>
@@ -52216,7 +52274,7 @@
                 </a:tc>
                 <a:extLst>
                   <a:ext uri="{0D108BD9-81ED-4DB2-BD59-A6C34878D82A}">
-                    <a16:rowId xmlns:a16="http://schemas.microsoft.com/office/drawing/2014/main" val="10000"/>
+                    <a16:rowId xmlns:a16="http://schemas.microsoft.com/office/drawing/2014/main" xmlns="" val="10000"/>
                   </a:ext>
                 </a:extLst>
               </a:tr>
@@ -53710,7 +53768,7 @@
                 </a:tc>
                 <a:extLst>
                   <a:ext uri="{0D108BD9-81ED-4DB2-BD59-A6C34878D82A}">
-                    <a16:rowId xmlns:a16="http://schemas.microsoft.com/office/drawing/2014/main" val="10001"/>
+                    <a16:rowId xmlns:a16="http://schemas.microsoft.com/office/drawing/2014/main" xmlns="" val="10001"/>
                   </a:ext>
                 </a:extLst>
               </a:tr>
@@ -53773,7 +53831,7 @@
                 </a:tc>
                 <a:extLst>
                   <a:ext uri="{0D108BD9-81ED-4DB2-BD59-A6C34878D82A}">
-                    <a16:rowId xmlns:a16="http://schemas.microsoft.com/office/drawing/2014/main" val="10002"/>
+                    <a16:rowId xmlns:a16="http://schemas.microsoft.com/office/drawing/2014/main" xmlns="" val="10002"/>
                   </a:ext>
                 </a:extLst>
               </a:tr>
@@ -53836,7 +53894,7 @@
                 </a:tc>
                 <a:extLst>
                   <a:ext uri="{0D108BD9-81ED-4DB2-BD59-A6C34878D82A}">
-                    <a16:rowId xmlns:a16="http://schemas.microsoft.com/office/drawing/2014/main" val="10003"/>
+                    <a16:rowId xmlns:a16="http://schemas.microsoft.com/office/drawing/2014/main" xmlns="" val="10003"/>
                   </a:ext>
                 </a:extLst>
               </a:tr>
@@ -53903,7 +53961,7 @@
                 </a:tc>
                 <a:extLst>
                   <a:ext uri="{0D108BD9-81ED-4DB2-BD59-A6C34878D82A}">
-                    <a16:rowId xmlns:a16="http://schemas.microsoft.com/office/drawing/2014/main" val="10004"/>
+                    <a16:rowId xmlns:a16="http://schemas.microsoft.com/office/drawing/2014/main" xmlns="" val="10004"/>
                   </a:ext>
                 </a:extLst>
               </a:tr>

</xml_diff>